<commit_message>
heurstic presentation V2 done
</commit_message>
<xml_diff>
--- a/Documentation/5. Recap Heuristic classifier - V2.pptx
+++ b/Documentation/5. Recap Heuristic classifier - V2.pptx
@@ -5,7 +5,7 @@
     <p:sldMasterId id="2147483661" r:id="rId1"/>
   </p:sldMasterIdLst>
   <p:notesMasterIdLst>
-    <p:notesMasterId r:id="rId37"/>
+    <p:notesMasterId r:id="rId38"/>
   </p:notesMasterIdLst>
   <p:sldIdLst>
     <p:sldId id="573" r:id="rId2"/>
@@ -36,13 +36,14 @@
     <p:sldId id="649" r:id="rId27"/>
     <p:sldId id="672" r:id="rId28"/>
     <p:sldId id="638" r:id="rId29"/>
-    <p:sldId id="673" r:id="rId30"/>
-    <p:sldId id="664" r:id="rId31"/>
-    <p:sldId id="657" r:id="rId32"/>
-    <p:sldId id="665" r:id="rId33"/>
-    <p:sldId id="666" r:id="rId34"/>
-    <p:sldId id="676" r:id="rId35"/>
-    <p:sldId id="675" r:id="rId36"/>
+    <p:sldId id="680" r:id="rId30"/>
+    <p:sldId id="673" r:id="rId31"/>
+    <p:sldId id="664" r:id="rId32"/>
+    <p:sldId id="657" r:id="rId33"/>
+    <p:sldId id="665" r:id="rId34"/>
+    <p:sldId id="666" r:id="rId35"/>
+    <p:sldId id="676" r:id="rId36"/>
+    <p:sldId id="675" r:id="rId37"/>
   </p:sldIdLst>
   <p:sldSz cx="12192000" cy="6858000"/>
   <p:notesSz cx="6858000" cy="9144000"/>
@@ -231,7 +232,7 @@
           <a:p>
             <a:fld id="{1A21894F-B278-4D96-9594-A030EA633187}" type="datetimeFigureOut">
               <a:rPr lang="it-IT" smtClean="0"/>
-              <a:t>10/11/2024</a:t>
+              <a:t>11/11/2024</a:t>
             </a:fld>
             <a:endParaRPr lang="it-IT"/>
           </a:p>
@@ -2642,6 +2643,114 @@
         <p:cNvPr id="1" name="">
           <a:extLst>
             <a:ext uri="{FF2B5EF4-FFF2-40B4-BE49-F238E27FC236}">
+              <a16:creationId xmlns:a16="http://schemas.microsoft.com/office/drawing/2014/main" id="{4B583170-300F-DB4E-3C77-E4AA9B06D3D5}"/>
+            </a:ext>
+          </a:extLst>
+        </p:cNvPr>
+        <p:cNvGrpSpPr/>
+        <p:nvPr/>
+      </p:nvGrpSpPr>
+      <p:grpSpPr>
+        <a:xfrm>
+          <a:off x="0" y="0"/>
+          <a:ext cx="0" cy="0"/>
+          <a:chOff x="0" y="0"/>
+          <a:chExt cx="0" cy="0"/>
+        </a:xfrm>
+      </p:grpSpPr>
+      <p:sp>
+        <p:nvSpPr>
+          <p:cNvPr id="2" name="Segnaposto immagine diapositiva 1">
+            <a:extLst>
+              <a:ext uri="{FF2B5EF4-FFF2-40B4-BE49-F238E27FC236}">
+                <a16:creationId xmlns:a16="http://schemas.microsoft.com/office/drawing/2014/main" id="{0C3114E6-FB46-E50B-210D-33B25B1C7938}"/>
+              </a:ext>
+            </a:extLst>
+          </p:cNvPr>
+          <p:cNvSpPr>
+            <a:spLocks noGrp="1" noRot="1" noChangeAspect="1"/>
+          </p:cNvSpPr>
+          <p:nvPr>
+            <p:ph type="sldImg"/>
+          </p:nvPr>
+        </p:nvSpPr>
+        <p:spPr/>
+      </p:sp>
+      <p:sp>
+        <p:nvSpPr>
+          <p:cNvPr id="3" name="Segnaposto note 2">
+            <a:extLst>
+              <a:ext uri="{FF2B5EF4-FFF2-40B4-BE49-F238E27FC236}">
+                <a16:creationId xmlns:a16="http://schemas.microsoft.com/office/drawing/2014/main" id="{88B200EB-68B0-6AE5-018C-D532A439AF23}"/>
+              </a:ext>
+            </a:extLst>
+          </p:cNvPr>
+          <p:cNvSpPr>
+            <a:spLocks noGrp="1"/>
+          </p:cNvSpPr>
+          <p:nvPr>
+            <p:ph type="body" idx="1"/>
+          </p:nvPr>
+        </p:nvSpPr>
+        <p:spPr/>
+        <p:txBody>
+          <a:bodyPr/>
+          <a:lstStyle/>
+          <a:p>
+            <a:endParaRPr lang="en-US" dirty="0"/>
+          </a:p>
+        </p:txBody>
+      </p:sp>
+      <p:sp>
+        <p:nvSpPr>
+          <p:cNvPr id="4" name="Segnaposto numero diapositiva 3">
+            <a:extLst>
+              <a:ext uri="{FF2B5EF4-FFF2-40B4-BE49-F238E27FC236}">
+                <a16:creationId xmlns:a16="http://schemas.microsoft.com/office/drawing/2014/main" id="{28BA4369-0A84-C9A6-5670-42D3374C6788}"/>
+              </a:ext>
+            </a:extLst>
+          </p:cNvPr>
+          <p:cNvSpPr>
+            <a:spLocks noGrp="1"/>
+          </p:cNvSpPr>
+          <p:nvPr>
+            <p:ph type="sldNum" sz="quarter" idx="5"/>
+          </p:nvPr>
+        </p:nvSpPr>
+        <p:spPr/>
+        <p:txBody>
+          <a:bodyPr/>
+          <a:lstStyle/>
+          <a:p>
+            <a:fld id="{802E5CB9-2BE2-4860-85EE-BBFABBF2603A}" type="slidenum">
+              <a:rPr lang="en-US" smtClean="0"/>
+              <a:t>29</a:t>
+            </a:fld>
+            <a:endParaRPr lang="en-US"/>
+          </a:p>
+        </p:txBody>
+      </p:sp>
+    </p:spTree>
+    <p:extLst>
+      <p:ext uri="{BB962C8B-B14F-4D97-AF65-F5344CB8AC3E}">
+        <p14:creationId xmlns:p14="http://schemas.microsoft.com/office/powerpoint/2010/main" val="2795777130"/>
+      </p:ext>
+    </p:extLst>
+  </p:cSld>
+  <p:clrMapOvr>
+    <a:masterClrMapping/>
+  </p:clrMapOvr>
+</p:notes>
+</file>
+
+<file path=ppt/notesSlides/notesSlide29.xml><?xml version="1.0" encoding="utf-8"?>
+<p:notes xmlns:a="http://schemas.openxmlformats.org/drawingml/2006/main" xmlns:r="http://schemas.openxmlformats.org/officeDocument/2006/relationships" xmlns:p="http://schemas.openxmlformats.org/presentationml/2006/main">
+  <p:cSld>
+    <p:spTree>
+      <p:nvGrpSpPr>
+        <p:cNvPr id="1" name="">
+          <a:extLst>
+            <a:ext uri="{FF2B5EF4-FFF2-40B4-BE49-F238E27FC236}">
               <a16:creationId xmlns:a16="http://schemas.microsoft.com/office/drawing/2014/main" id="{3B23384C-1784-B341-F5DB-6EFA0BD14E7C}"/>
             </a:ext>
           </a:extLst>
@@ -2723,7 +2832,7 @@
           <a:p>
             <a:fld id="{802E5CB9-2BE2-4860-85EE-BBFABBF2603A}" type="slidenum">
               <a:rPr lang="en-US" smtClean="0"/>
-              <a:t>29</a:t>
+              <a:t>30</a:t>
             </a:fld>
             <a:endParaRPr lang="en-US" dirty="0"/>
           </a:p>
@@ -2733,150 +2842,6 @@
     <p:extLst>
       <p:ext uri="{BB962C8B-B14F-4D97-AF65-F5344CB8AC3E}">
         <p14:creationId xmlns:p14="http://schemas.microsoft.com/office/powerpoint/2010/main" val="1756114829"/>
-      </p:ext>
-    </p:extLst>
-  </p:cSld>
-  <p:clrMapOvr>
-    <a:masterClrMapping/>
-  </p:clrMapOvr>
-</p:notes>
-</file>
-
-<file path=ppt/notesSlides/notesSlide29.xml><?xml version="1.0" encoding="utf-8"?>
-<p:notes xmlns:a="http://schemas.openxmlformats.org/drawingml/2006/main" xmlns:r="http://schemas.openxmlformats.org/officeDocument/2006/relationships" xmlns:p="http://schemas.openxmlformats.org/presentationml/2006/main">
-  <p:cSld>
-    <p:spTree>
-      <p:nvGrpSpPr>
-        <p:cNvPr id="1" name=""/>
-        <p:cNvGrpSpPr/>
-        <p:nvPr/>
-      </p:nvGrpSpPr>
-      <p:grpSpPr>
-        <a:xfrm>
-          <a:off x="0" y="0"/>
-          <a:ext cx="0" cy="0"/>
-          <a:chOff x="0" y="0"/>
-          <a:chExt cx="0" cy="0"/>
-        </a:xfrm>
-      </p:grpSpPr>
-      <p:sp>
-        <p:nvSpPr>
-          <p:cNvPr id="2" name="Segnaposto immagine diapositiva 1"/>
-          <p:cNvSpPr>
-            <a:spLocks noGrp="1" noRot="1" noChangeAspect="1"/>
-          </p:cNvSpPr>
-          <p:nvPr>
-            <p:ph type="sldImg"/>
-          </p:nvPr>
-        </p:nvSpPr>
-        <p:spPr/>
-      </p:sp>
-      <p:sp>
-        <p:nvSpPr>
-          <p:cNvPr id="3" name="Segnaposto note 2"/>
-          <p:cNvSpPr>
-            <a:spLocks noGrp="1"/>
-          </p:cNvSpPr>
-          <p:nvPr>
-            <p:ph type="body" idx="1"/>
-          </p:nvPr>
-        </p:nvSpPr>
-        <p:spPr/>
-        <p:txBody>
-          <a:bodyPr/>
-          <a:lstStyle/>
-          <a:p>
-            <a:endParaRPr lang="en-US" dirty="0"/>
-          </a:p>
-        </p:txBody>
-      </p:sp>
-      <p:sp>
-        <p:nvSpPr>
-          <p:cNvPr id="4" name="Segnaposto numero diapositiva 3"/>
-          <p:cNvSpPr>
-            <a:spLocks noGrp="1"/>
-          </p:cNvSpPr>
-          <p:nvPr>
-            <p:ph type="sldNum" sz="quarter" idx="5"/>
-          </p:nvPr>
-        </p:nvSpPr>
-        <p:spPr/>
-        <p:txBody>
-          <a:bodyPr/>
-          <a:lstStyle/>
-          <a:p>
-            <a:pPr marL="0" marR="0" lvl="0" indent="0" algn="r" defTabSz="914400" rtl="0" eaLnBrk="1" fontAlgn="auto" latinLnBrk="0" hangingPunct="1">
-              <a:lnSpc>
-                <a:spcPct val="100000"/>
-              </a:lnSpc>
-              <a:spcBef>
-                <a:spcPts val="0"/>
-              </a:spcBef>
-              <a:spcAft>
-                <a:spcPts val="0"/>
-              </a:spcAft>
-              <a:buClrTx/>
-              <a:buSzTx/>
-              <a:buFontTx/>
-              <a:buNone/>
-              <a:tabLst/>
-              <a:defRPr/>
-            </a:pPr>
-            <a:fld id="{802E5CB9-2BE2-4860-85EE-BBFABBF2603A}" type="slidenum">
-              <a:rPr kumimoji="0" lang="en-US" sz="1200" b="0" i="0" u="none" strike="noStrike" kern="1200" cap="none" spc="0" normalizeH="0" baseline="0" noProof="0" smtClean="0">
-                <a:ln>
-                  <a:noFill/>
-                </a:ln>
-                <a:solidFill>
-                  <a:prstClr val="black"/>
-                </a:solidFill>
-                <a:effectLst/>
-                <a:uLnTx/>
-                <a:uFillTx/>
-                <a:latin typeface="Aptos" panose="02110004020202020204"/>
-                <a:ea typeface="+mn-ea"/>
-                <a:cs typeface="+mn-cs"/>
-              </a:rPr>
-              <a:pPr marL="0" marR="0" lvl="0" indent="0" algn="r" defTabSz="914400" rtl="0" eaLnBrk="1" fontAlgn="auto" latinLnBrk="0" hangingPunct="1">
-                <a:lnSpc>
-                  <a:spcPct val="100000"/>
-                </a:lnSpc>
-                <a:spcBef>
-                  <a:spcPts val="0"/>
-                </a:spcBef>
-                <a:spcAft>
-                  <a:spcPts val="0"/>
-                </a:spcAft>
-                <a:buClrTx/>
-                <a:buSzTx/>
-                <a:buFontTx/>
-                <a:buNone/>
-                <a:tabLst/>
-                <a:defRPr/>
-              </a:pPr>
-              <a:t>30</a:t>
-            </a:fld>
-            <a:endParaRPr kumimoji="0" lang="en-US" sz="1200" b="0" i="0" u="none" strike="noStrike" kern="1200" cap="none" spc="0" normalizeH="0" baseline="0" noProof="0">
-              <a:ln>
-                <a:noFill/>
-              </a:ln>
-              <a:solidFill>
-                <a:prstClr val="black"/>
-              </a:solidFill>
-              <a:effectLst/>
-              <a:uLnTx/>
-              <a:uFillTx/>
-              <a:latin typeface="Aptos" panose="02110004020202020204"/>
-              <a:ea typeface="+mn-ea"/>
-              <a:cs typeface="+mn-cs"/>
-            </a:endParaRPr>
-          </a:p>
-        </p:txBody>
-      </p:sp>
-    </p:spTree>
-    <p:extLst>
-      <p:ext uri="{BB962C8B-B14F-4D97-AF65-F5344CB8AC3E}">
-        <p14:creationId xmlns:p14="http://schemas.microsoft.com/office/powerpoint/2010/main" val="846966909"/>
       </p:ext>
     </p:extLst>
   </p:cSld>
@@ -2975,6 +2940,150 @@
   <p:cSld>
     <p:spTree>
       <p:nvGrpSpPr>
+        <p:cNvPr id="1" name=""/>
+        <p:cNvGrpSpPr/>
+        <p:nvPr/>
+      </p:nvGrpSpPr>
+      <p:grpSpPr>
+        <a:xfrm>
+          <a:off x="0" y="0"/>
+          <a:ext cx="0" cy="0"/>
+          <a:chOff x="0" y="0"/>
+          <a:chExt cx="0" cy="0"/>
+        </a:xfrm>
+      </p:grpSpPr>
+      <p:sp>
+        <p:nvSpPr>
+          <p:cNvPr id="2" name="Segnaposto immagine diapositiva 1"/>
+          <p:cNvSpPr>
+            <a:spLocks noGrp="1" noRot="1" noChangeAspect="1"/>
+          </p:cNvSpPr>
+          <p:nvPr>
+            <p:ph type="sldImg"/>
+          </p:nvPr>
+        </p:nvSpPr>
+        <p:spPr/>
+      </p:sp>
+      <p:sp>
+        <p:nvSpPr>
+          <p:cNvPr id="3" name="Segnaposto note 2"/>
+          <p:cNvSpPr>
+            <a:spLocks noGrp="1"/>
+          </p:cNvSpPr>
+          <p:nvPr>
+            <p:ph type="body" idx="1"/>
+          </p:nvPr>
+        </p:nvSpPr>
+        <p:spPr/>
+        <p:txBody>
+          <a:bodyPr/>
+          <a:lstStyle/>
+          <a:p>
+            <a:endParaRPr lang="en-US" dirty="0"/>
+          </a:p>
+        </p:txBody>
+      </p:sp>
+      <p:sp>
+        <p:nvSpPr>
+          <p:cNvPr id="4" name="Segnaposto numero diapositiva 3"/>
+          <p:cNvSpPr>
+            <a:spLocks noGrp="1"/>
+          </p:cNvSpPr>
+          <p:nvPr>
+            <p:ph type="sldNum" sz="quarter" idx="5"/>
+          </p:nvPr>
+        </p:nvSpPr>
+        <p:spPr/>
+        <p:txBody>
+          <a:bodyPr/>
+          <a:lstStyle/>
+          <a:p>
+            <a:pPr marL="0" marR="0" lvl="0" indent="0" algn="r" defTabSz="914400" rtl="0" eaLnBrk="1" fontAlgn="auto" latinLnBrk="0" hangingPunct="1">
+              <a:lnSpc>
+                <a:spcPct val="100000"/>
+              </a:lnSpc>
+              <a:spcBef>
+                <a:spcPts val="0"/>
+              </a:spcBef>
+              <a:spcAft>
+                <a:spcPts val="0"/>
+              </a:spcAft>
+              <a:buClrTx/>
+              <a:buSzTx/>
+              <a:buFontTx/>
+              <a:buNone/>
+              <a:tabLst/>
+              <a:defRPr/>
+            </a:pPr>
+            <a:fld id="{802E5CB9-2BE2-4860-85EE-BBFABBF2603A}" type="slidenum">
+              <a:rPr kumimoji="0" lang="en-US" sz="1200" b="0" i="0" u="none" strike="noStrike" kern="1200" cap="none" spc="0" normalizeH="0" baseline="0" noProof="0" smtClean="0">
+                <a:ln>
+                  <a:noFill/>
+                </a:ln>
+                <a:solidFill>
+                  <a:prstClr val="black"/>
+                </a:solidFill>
+                <a:effectLst/>
+                <a:uLnTx/>
+                <a:uFillTx/>
+                <a:latin typeface="Aptos" panose="02110004020202020204"/>
+                <a:ea typeface="+mn-ea"/>
+                <a:cs typeface="+mn-cs"/>
+              </a:rPr>
+              <a:pPr marL="0" marR="0" lvl="0" indent="0" algn="r" defTabSz="914400" rtl="0" eaLnBrk="1" fontAlgn="auto" latinLnBrk="0" hangingPunct="1">
+                <a:lnSpc>
+                  <a:spcPct val="100000"/>
+                </a:lnSpc>
+                <a:spcBef>
+                  <a:spcPts val="0"/>
+                </a:spcBef>
+                <a:spcAft>
+                  <a:spcPts val="0"/>
+                </a:spcAft>
+                <a:buClrTx/>
+                <a:buSzTx/>
+                <a:buFontTx/>
+                <a:buNone/>
+                <a:tabLst/>
+                <a:defRPr/>
+              </a:pPr>
+              <a:t>31</a:t>
+            </a:fld>
+            <a:endParaRPr kumimoji="0" lang="en-US" sz="1200" b="0" i="0" u="none" strike="noStrike" kern="1200" cap="none" spc="0" normalizeH="0" baseline="0" noProof="0">
+              <a:ln>
+                <a:noFill/>
+              </a:ln>
+              <a:solidFill>
+                <a:prstClr val="black"/>
+              </a:solidFill>
+              <a:effectLst/>
+              <a:uLnTx/>
+              <a:uFillTx/>
+              <a:latin typeface="Aptos" panose="02110004020202020204"/>
+              <a:ea typeface="+mn-ea"/>
+              <a:cs typeface="+mn-cs"/>
+            </a:endParaRPr>
+          </a:p>
+        </p:txBody>
+      </p:sp>
+    </p:spTree>
+    <p:extLst>
+      <p:ext uri="{BB962C8B-B14F-4D97-AF65-F5344CB8AC3E}">
+        <p14:creationId xmlns:p14="http://schemas.microsoft.com/office/powerpoint/2010/main" val="846966909"/>
+      </p:ext>
+    </p:extLst>
+  </p:cSld>
+  <p:clrMapOvr>
+    <a:masterClrMapping/>
+  </p:clrMapOvr>
+</p:notes>
+</file>
+
+<file path=ppt/notesSlides/notesSlide31.xml><?xml version="1.0" encoding="utf-8"?>
+<p:notes xmlns:a="http://schemas.openxmlformats.org/drawingml/2006/main" xmlns:r="http://schemas.openxmlformats.org/officeDocument/2006/relationships" xmlns:p="http://schemas.openxmlformats.org/presentationml/2006/main">
+  <p:cSld>
+    <p:spTree>
+      <p:nvGrpSpPr>
         <p:cNvPr id="1" name="">
           <a:extLst>
             <a:ext uri="{FF2B5EF4-FFF2-40B4-BE49-F238E27FC236}">
@@ -3059,7 +3168,7 @@
           <a:p>
             <a:fld id="{802E5CB9-2BE2-4860-85EE-BBFABBF2603A}" type="slidenum">
               <a:rPr lang="en-US" smtClean="0"/>
-              <a:t>31</a:t>
+              <a:t>32</a:t>
             </a:fld>
             <a:endParaRPr lang="en-US"/>
           </a:p>
@@ -3078,7 +3187,7 @@
 </p:notes>
 </file>
 
-<file path=ppt/notesSlides/notesSlide31.xml><?xml version="1.0" encoding="utf-8"?>
+<file path=ppt/notesSlides/notesSlide32.xml><?xml version="1.0" encoding="utf-8"?>
 <p:notes xmlns:a="http://schemas.openxmlformats.org/drawingml/2006/main" xmlns:r="http://schemas.openxmlformats.org/officeDocument/2006/relationships" xmlns:p="http://schemas.openxmlformats.org/presentationml/2006/main">
   <p:cSld>
     <p:spTree>
@@ -3167,7 +3276,7 @@
           <a:p>
             <a:fld id="{802E5CB9-2BE2-4860-85EE-BBFABBF2603A}" type="slidenum">
               <a:rPr lang="en-US" smtClean="0"/>
-              <a:t>32</a:t>
+              <a:t>33</a:t>
             </a:fld>
             <a:endParaRPr lang="en-US"/>
           </a:p>
@@ -3186,7 +3295,7 @@
 </p:notes>
 </file>
 
-<file path=ppt/notesSlides/notesSlide32.xml><?xml version="1.0" encoding="utf-8"?>
+<file path=ppt/notesSlides/notesSlide33.xml><?xml version="1.0" encoding="utf-8"?>
 <p:notes xmlns:a="http://schemas.openxmlformats.org/drawingml/2006/main" xmlns:r="http://schemas.openxmlformats.org/officeDocument/2006/relationships" xmlns:p="http://schemas.openxmlformats.org/presentationml/2006/main">
   <p:cSld>
     <p:spTree>
@@ -3275,7 +3384,7 @@
           <a:p>
             <a:fld id="{802E5CB9-2BE2-4860-85EE-BBFABBF2603A}" type="slidenum">
               <a:rPr lang="en-US" smtClean="0"/>
-              <a:t>33</a:t>
+              <a:t>34</a:t>
             </a:fld>
             <a:endParaRPr lang="en-US"/>
           </a:p>
@@ -3294,7 +3403,7 @@
 </p:notes>
 </file>
 
-<file path=ppt/notesSlides/notesSlide33.xml><?xml version="1.0" encoding="utf-8"?>
+<file path=ppt/notesSlides/notesSlide34.xml><?xml version="1.0" encoding="utf-8"?>
 <p:notes xmlns:a="http://schemas.openxmlformats.org/drawingml/2006/main" xmlns:r="http://schemas.openxmlformats.org/officeDocument/2006/relationships" xmlns:p="http://schemas.openxmlformats.org/presentationml/2006/main">
   <p:cSld>
     <p:spTree>
@@ -3383,7 +3492,7 @@
           <a:p>
             <a:fld id="{802E5CB9-2BE2-4860-85EE-BBFABBF2603A}" type="slidenum">
               <a:rPr lang="en-US" smtClean="0"/>
-              <a:t>34</a:t>
+              <a:t>35</a:t>
             </a:fld>
             <a:endParaRPr lang="en-US"/>
           </a:p>
@@ -3402,7 +3511,7 @@
 </p:notes>
 </file>
 
-<file path=ppt/notesSlides/notesSlide34.xml><?xml version="1.0" encoding="utf-8"?>
+<file path=ppt/notesSlides/notesSlide35.xml><?xml version="1.0" encoding="utf-8"?>
 <p:notes xmlns:a="http://schemas.openxmlformats.org/drawingml/2006/main" xmlns:r="http://schemas.openxmlformats.org/officeDocument/2006/relationships" xmlns:p="http://schemas.openxmlformats.org/presentationml/2006/main">
   <p:cSld>
     <p:spTree>
@@ -3491,7 +3600,7 @@
           <a:p>
             <a:fld id="{802E5CB9-2BE2-4860-85EE-BBFABBF2603A}" type="slidenum">
               <a:rPr lang="en-US" smtClean="0"/>
-              <a:t>35</a:t>
+              <a:t>36</a:t>
             </a:fld>
             <a:endParaRPr lang="en-US"/>
           </a:p>
@@ -4571,7 +4680,7 @@
           <a:p>
             <a:fld id="{58E4D78B-0F35-4E3B-A0B9-554BA787D8A4}" type="datetime1">
               <a:rPr lang="en-US" smtClean="0"/>
-              <a:t>11/10/2024</a:t>
+              <a:t>11/11/2024</a:t>
             </a:fld>
             <a:endParaRPr lang="en-US"/>
           </a:p>
@@ -4781,7 +4890,7 @@
           <a:p>
             <a:fld id="{604487E5-BE79-4BAC-AEB7-0CE0533B5E5C}" type="datetime1">
               <a:rPr lang="en-US" smtClean="0"/>
-              <a:t>11/10/2024</a:t>
+              <a:t>11/11/2024</a:t>
             </a:fld>
             <a:endParaRPr lang="en-US"/>
           </a:p>
@@ -4981,7 +5090,7 @@
           <a:p>
             <a:fld id="{DDA7E0CB-9E21-49FD-99A0-0CD75BBC45F4}" type="datetime1">
               <a:rPr lang="en-US" smtClean="0"/>
-              <a:t>11/10/2024</a:t>
+              <a:t>11/11/2024</a:t>
             </a:fld>
             <a:endParaRPr lang="en-US"/>
           </a:p>
@@ -5257,7 +5366,7 @@
           <a:p>
             <a:fld id="{661D7149-FE96-419A-8F67-9BD351842985}" type="datetime1">
               <a:rPr lang="en-US" smtClean="0"/>
-              <a:t>11/10/2024</a:t>
+              <a:t>11/11/2024</a:t>
             </a:fld>
             <a:endParaRPr lang="en-US"/>
           </a:p>
@@ -5525,7 +5634,7 @@
           <a:p>
             <a:fld id="{6CA97CEF-DD94-4A20-85BC-5094F3EA8887}" type="datetime1">
               <a:rPr lang="en-US" smtClean="0"/>
-              <a:t>11/10/2024</a:t>
+              <a:t>11/11/2024</a:t>
             </a:fld>
             <a:endParaRPr lang="en-US"/>
           </a:p>
@@ -5940,7 +6049,7 @@
           <a:p>
             <a:fld id="{9862EB4C-45F8-47BA-B435-B6097D61B684}" type="datetime1">
               <a:rPr lang="en-US" smtClean="0"/>
-              <a:t>11/10/2024</a:t>
+              <a:t>11/11/2024</a:t>
             </a:fld>
             <a:endParaRPr lang="en-US"/>
           </a:p>
@@ -6082,7 +6191,7 @@
           <a:p>
             <a:fld id="{FA7CD0E2-B7EC-4D81-9389-8F889EE865AB}" type="datetime1">
               <a:rPr lang="en-US" smtClean="0"/>
-              <a:t>11/10/2024</a:t>
+              <a:t>11/11/2024</a:t>
             </a:fld>
             <a:endParaRPr lang="en-US"/>
           </a:p>
@@ -6195,7 +6304,7 @@
           <a:p>
             <a:fld id="{18B47F5C-7FA0-44DA-BF82-413AB90208B7}" type="datetime1">
               <a:rPr lang="en-US" smtClean="0"/>
-              <a:t>11/10/2024</a:t>
+              <a:t>11/11/2024</a:t>
             </a:fld>
             <a:endParaRPr lang="en-US"/>
           </a:p>
@@ -6508,7 +6617,7 @@
           <a:p>
             <a:fld id="{403415A8-F8BD-47CC-8D20-53798396961D}" type="datetime1">
               <a:rPr lang="en-US" smtClean="0"/>
-              <a:t>11/10/2024</a:t>
+              <a:t>11/11/2024</a:t>
             </a:fld>
             <a:endParaRPr lang="en-US"/>
           </a:p>
@@ -6797,7 +6906,7 @@
           <a:p>
             <a:fld id="{6A12F5A1-6669-4CDD-B1B4-04FFE5C41ADE}" type="datetime1">
               <a:rPr lang="en-US" smtClean="0"/>
-              <a:t>11/10/2024</a:t>
+              <a:t>11/11/2024</a:t>
             </a:fld>
             <a:endParaRPr lang="en-US"/>
           </a:p>
@@ -7001,7 +7110,7 @@
           <a:p>
             <a:fld id="{63421662-C242-4258-8799-9F32C0D7CC75}" type="datetime1">
               <a:rPr lang="en-US" smtClean="0"/>
-              <a:t>11/10/2024</a:t>
+              <a:t>11/11/2024</a:t>
             </a:fld>
             <a:endParaRPr lang="en-US"/>
           </a:p>
@@ -10718,7 +10827,7 @@
           <a:p>
             <a:r>
               <a:rPr lang="en-US" sz="1400" dirty="0"/>
-              <a:t>Atrial peak does not seem to be discriminative of MAP A from MAP B, while the ratio atrial/ventricular peak open to a possibility</a:t>
+              <a:t>Atrial peak does not seem to be discriminative of MAP A from MAP B, in contrast with literature. On the other hand, atrial/ventricular peak ratio opens to a possibility</a:t>
             </a:r>
           </a:p>
           <a:p>
@@ -16320,57 +16429,22 @@
           </a:p>
         </p:txBody>
       </p:sp>
-      <p:pic>
-        <p:nvPicPr>
-          <p:cNvPr id="6" name="Immagine 5">
-            <a:extLst>
-              <a:ext uri="{FF2B5EF4-FFF2-40B4-BE49-F238E27FC236}">
-                <a16:creationId xmlns:a16="http://schemas.microsoft.com/office/drawing/2014/main" id="{C66621A5-8CBA-BFA4-B65F-76845F683AA1}"/>
-              </a:ext>
-            </a:extLst>
-          </p:cNvPr>
-          <p:cNvPicPr>
-            <a:picLocks noChangeAspect="1"/>
-          </p:cNvPicPr>
+      <p:sp>
+        <p:nvSpPr>
+          <p:cNvPr id="5" name="Rettangolo con angoli arrotondati 4">
+            <a:extLst>
+              <a:ext uri="{FF2B5EF4-FFF2-40B4-BE49-F238E27FC236}">
+                <a16:creationId xmlns:a16="http://schemas.microsoft.com/office/drawing/2014/main" id="{A303FCFD-CE72-6EB0-8947-B44AB0604037}"/>
+              </a:ext>
+            </a:extLst>
+          </p:cNvPr>
+          <p:cNvSpPr/>
           <p:nvPr/>
-        </p:nvPicPr>
-        <p:blipFill>
-          <a:blip r:embed="rId3">
-            <a:extLst>
-              <a:ext uri="{28A0092B-C50C-407E-A947-70E740481C1C}">
-                <a14:useLocalDpi xmlns:a14="http://schemas.microsoft.com/office/drawing/2010/main" val="0"/>
-              </a:ext>
-            </a:extLst>
-          </a:blip>
-          <a:srcRect/>
-          <a:stretch/>
-        </p:blipFill>
+        </p:nvSpPr>
         <p:spPr>
           <a:xfrm>
-            <a:off x="5827393" y="1628928"/>
-            <a:ext cx="5716046" cy="3835768"/>
-          </a:xfrm>
-          <a:prstGeom prst="rect">
-            <a:avLst/>
-          </a:prstGeom>
-        </p:spPr>
-      </p:pic>
-      <p:sp>
-        <p:nvSpPr>
-          <p:cNvPr id="3" name="Rettangolo con angoli arrotondati 2">
-            <a:extLst>
-              <a:ext uri="{FF2B5EF4-FFF2-40B4-BE49-F238E27FC236}">
-                <a16:creationId xmlns:a16="http://schemas.microsoft.com/office/drawing/2014/main" id="{6293BAB2-86C0-984E-7683-209FA032F968}"/>
-              </a:ext>
-            </a:extLst>
-          </p:cNvPr>
-          <p:cNvSpPr/>
-          <p:nvPr/>
-        </p:nvSpPr>
-        <p:spPr>
-          <a:xfrm>
-            <a:off x="838200" y="5038344"/>
-            <a:ext cx="2057400" cy="1188720"/>
+            <a:off x="838200" y="5449824"/>
+            <a:ext cx="2057400" cy="777240"/>
           </a:xfrm>
           <a:prstGeom prst="roundRect">
             <a:avLst/>
@@ -16398,10 +16472,10 @@
             <a:r>
               <a:rPr lang="en-GB" sz="1200" dirty="0">
                 <a:solidFill>
-                  <a:srgbClr val="0070C0"/>
+                  <a:schemeClr val="accent6"/>
                 </a:solidFill>
               </a:rPr>
-              <a:t>Blue boxes</a:t>
+              <a:t>Green boxes </a:t>
             </a:r>
             <a:r>
               <a:rPr lang="en-GB" sz="1200" dirty="0">
@@ -16409,31 +16483,15 @@
                   <a:srgbClr val="19232D"/>
                 </a:solidFill>
               </a:rPr>
-              <a:t>: MAP A atrial peak threshold, </a:t>
+              <a:t>: MAP A atrial peak threshold,</a:t>
             </a:r>
             <a:r>
               <a:rPr lang="en-GB" sz="1200" dirty="0">
                 <a:solidFill>
-                  <a:schemeClr val="accent6"/>
+                  <a:srgbClr val="FF0000"/>
                 </a:solidFill>
               </a:rPr>
-              <a:t>green boxes </a:t>
-            </a:r>
-            <a:r>
-              <a:rPr lang="en-GB" sz="1200" dirty="0">
-                <a:solidFill>
-                  <a:srgbClr val="19232D"/>
-                </a:solidFill>
-              </a:rPr>
-              <a:t>MAP B atrial threshold</a:t>
-            </a:r>
-            <a:r>
-              <a:rPr lang="en-GB" sz="1200" dirty="0">
-                <a:solidFill>
-                  <a:srgbClr val="FF0000"/>
-                </a:solidFill>
-              </a:rPr>
-              <a:t>, red dashed lines</a:t>
+              <a:t> red dashed lines</a:t>
             </a:r>
             <a:r>
               <a:rPr lang="en-GB" sz="1200" dirty="0">
@@ -16446,6 +16504,42 @@
           </a:p>
         </p:txBody>
       </p:sp>
+      <p:pic>
+        <p:nvPicPr>
+          <p:cNvPr id="8" name="Immagine 7" descr="Immagine che contiene testo, schermata, linea, Diagramma&#10;&#10;Descrizione generata automaticamente">
+            <a:extLst>
+              <a:ext uri="{FF2B5EF4-FFF2-40B4-BE49-F238E27FC236}">
+                <a16:creationId xmlns:a16="http://schemas.microsoft.com/office/drawing/2014/main" id="{D8AAD368-6FFB-0FEB-08A2-F56E1C5E7460}"/>
+              </a:ext>
+            </a:extLst>
+          </p:cNvPr>
+          <p:cNvPicPr>
+            <a:picLocks noChangeAspect="1"/>
+          </p:cNvPicPr>
+          <p:nvPr/>
+        </p:nvPicPr>
+        <p:blipFill>
+          <a:blip r:embed="rId3">
+            <a:extLst>
+              <a:ext uri="{28A0092B-C50C-407E-A947-70E740481C1C}">
+                <a14:useLocalDpi xmlns:a14="http://schemas.microsoft.com/office/drawing/2010/main" val="0"/>
+              </a:ext>
+            </a:extLst>
+          </a:blip>
+          <a:stretch>
+            <a:fillRect/>
+          </a:stretch>
+        </p:blipFill>
+        <p:spPr>
+          <a:xfrm>
+            <a:off x="5614231" y="1757461"/>
+            <a:ext cx="5815212" cy="3902313"/>
+          </a:xfrm>
+          <a:prstGeom prst="rect">
+            <a:avLst/>
+          </a:prstGeom>
+        </p:spPr>
+      </p:pic>
     </p:spTree>
     <p:extLst>
       <p:ext uri="{BB962C8B-B14F-4D97-AF65-F5344CB8AC3E}">
@@ -16512,7 +16606,7 @@
           <a:p>
             <a:r>
               <a:rPr lang="en-US" sz="3600" dirty="0"/>
-              <a:t>Correctly classified example 1</a:t>
+              <a:t>Correctly classified from both strategies: example 1</a:t>
             </a:r>
           </a:p>
         </p:txBody>
@@ -16804,7 +16898,7 @@
         <p:spPr>
           <a:xfrm>
             <a:off x="5285233" y="1629394"/>
-            <a:ext cx="5992378" cy="3966738"/>
+            <a:ext cx="5992378" cy="3966737"/>
           </a:xfrm>
           <a:prstGeom prst="rect">
             <a:avLst/>
@@ -16825,8 +16919,8 @@
         </p:nvSpPr>
         <p:spPr>
           <a:xfrm>
-            <a:off x="838200" y="5038344"/>
-            <a:ext cx="2057400" cy="1188720"/>
+            <a:off x="838200" y="5449824"/>
+            <a:ext cx="2057400" cy="777240"/>
           </a:xfrm>
           <a:prstGeom prst="roundRect">
             <a:avLst/>
@@ -16854,10 +16948,10 @@
             <a:r>
               <a:rPr lang="en-GB" sz="1200" dirty="0">
                 <a:solidFill>
-                  <a:srgbClr val="0070C0"/>
+                  <a:schemeClr val="accent6"/>
                 </a:solidFill>
               </a:rPr>
-              <a:t>Blue boxes</a:t>
+              <a:t>Green boxes </a:t>
             </a:r>
             <a:r>
               <a:rPr lang="en-GB" sz="1200" dirty="0">
@@ -16865,31 +16959,15 @@
                   <a:srgbClr val="19232D"/>
                 </a:solidFill>
               </a:rPr>
-              <a:t>: MAP A atrial peak threshold, </a:t>
+              <a:t>: MAP A atrial peak threshold,</a:t>
             </a:r>
             <a:r>
               <a:rPr lang="en-GB" sz="1200" dirty="0">
                 <a:solidFill>
-                  <a:schemeClr val="accent6"/>
+                  <a:srgbClr val="FF0000"/>
                 </a:solidFill>
               </a:rPr>
-              <a:t>green boxes </a:t>
-            </a:r>
-            <a:r>
-              <a:rPr lang="en-GB" sz="1200" dirty="0">
-                <a:solidFill>
-                  <a:srgbClr val="19232D"/>
-                </a:solidFill>
-              </a:rPr>
-              <a:t>MAP B atrial threshold</a:t>
-            </a:r>
-            <a:r>
-              <a:rPr lang="en-GB" sz="1200" dirty="0">
-                <a:solidFill>
-                  <a:srgbClr val="FF0000"/>
-                </a:solidFill>
-              </a:rPr>
-              <a:t>, red dashed lines</a:t>
+              <a:t> red dashed lines</a:t>
             </a:r>
             <a:r>
               <a:rPr lang="en-GB" sz="1200" dirty="0">
@@ -16968,7 +17046,7 @@
           <a:p>
             <a:r>
               <a:rPr lang="en-US" sz="3600" dirty="0"/>
-              <a:t>Correctly classified example 2</a:t>
+              <a:t>Correctly classified from both strategies: example 2</a:t>
             </a:r>
           </a:p>
         </p:txBody>
@@ -17246,7 +17324,7 @@
         <p:spPr>
           <a:xfrm>
             <a:off x="5239513" y="1629501"/>
-            <a:ext cx="6038098" cy="3997003"/>
+            <a:ext cx="6038098" cy="3997002"/>
           </a:xfrm>
           <a:prstGeom prst="rect">
             <a:avLst/>
@@ -17255,10 +17333,10 @@
       </p:pic>
       <p:sp>
         <p:nvSpPr>
-          <p:cNvPr id="3" name="Rettangolo con angoli arrotondati 2">
-            <a:extLst>
-              <a:ext uri="{FF2B5EF4-FFF2-40B4-BE49-F238E27FC236}">
-                <a16:creationId xmlns:a16="http://schemas.microsoft.com/office/drawing/2014/main" id="{A126CA8B-65CF-BF79-CE88-2B645D955341}"/>
+          <p:cNvPr id="5" name="Rettangolo con angoli arrotondati 4">
+            <a:extLst>
+              <a:ext uri="{FF2B5EF4-FFF2-40B4-BE49-F238E27FC236}">
+                <a16:creationId xmlns:a16="http://schemas.microsoft.com/office/drawing/2014/main" id="{6848B8A1-533D-5E39-1354-5DF8CC444F8B}"/>
               </a:ext>
             </a:extLst>
           </p:cNvPr>
@@ -17267,8 +17345,8 @@
         </p:nvSpPr>
         <p:spPr>
           <a:xfrm>
-            <a:off x="838200" y="5038344"/>
-            <a:ext cx="2057400" cy="1188720"/>
+            <a:off x="838200" y="5449824"/>
+            <a:ext cx="2057400" cy="777240"/>
           </a:xfrm>
           <a:prstGeom prst="roundRect">
             <a:avLst/>
@@ -17296,10 +17374,10 @@
             <a:r>
               <a:rPr lang="en-GB" sz="1200" dirty="0">
                 <a:solidFill>
-                  <a:srgbClr val="0070C0"/>
+                  <a:schemeClr val="accent6"/>
                 </a:solidFill>
               </a:rPr>
-              <a:t>Blue boxes</a:t>
+              <a:t>Green boxes </a:t>
             </a:r>
             <a:r>
               <a:rPr lang="en-GB" sz="1200" dirty="0">
@@ -17307,31 +17385,15 @@
                   <a:srgbClr val="19232D"/>
                 </a:solidFill>
               </a:rPr>
-              <a:t>: MAP A atrial peak threshold, </a:t>
+              <a:t>: MAP A atrial peak threshold,</a:t>
             </a:r>
             <a:r>
               <a:rPr lang="en-GB" sz="1200" dirty="0">
                 <a:solidFill>
-                  <a:schemeClr val="accent6"/>
+                  <a:srgbClr val="FF0000"/>
                 </a:solidFill>
               </a:rPr>
-              <a:t>green boxes </a:t>
-            </a:r>
-            <a:r>
-              <a:rPr lang="en-GB" sz="1200" dirty="0">
-                <a:solidFill>
-                  <a:srgbClr val="19232D"/>
-                </a:solidFill>
-              </a:rPr>
-              <a:t>MAP B atrial threshold</a:t>
-            </a:r>
-            <a:r>
-              <a:rPr lang="en-GB" sz="1200" dirty="0">
-                <a:solidFill>
-                  <a:srgbClr val="FF0000"/>
-                </a:solidFill>
-              </a:rPr>
-              <a:t>, red dashed lines</a:t>
+              <a:t> red dashed lines</a:t>
             </a:r>
             <a:r>
               <a:rPr lang="en-GB" sz="1200" dirty="0">
@@ -17410,7 +17472,7 @@
           <a:p>
             <a:r>
               <a:rPr lang="en-US" sz="3600" dirty="0"/>
-              <a:t>Correctly classified example 3</a:t>
+              <a:t>Correctly classified from both strategies: example 3</a:t>
             </a:r>
           </a:p>
         </p:txBody>
@@ -17705,7 +17767,7 @@
         <p:spPr>
           <a:xfrm>
             <a:off x="5413249" y="1629093"/>
-            <a:ext cx="5864362" cy="3881996"/>
+            <a:ext cx="5864362" cy="3881995"/>
           </a:xfrm>
           <a:prstGeom prst="rect">
             <a:avLst/>
@@ -17714,10 +17776,10 @@
       </p:pic>
       <p:sp>
         <p:nvSpPr>
-          <p:cNvPr id="5" name="Rettangolo con angoli arrotondati 4">
-            <a:extLst>
-              <a:ext uri="{FF2B5EF4-FFF2-40B4-BE49-F238E27FC236}">
-                <a16:creationId xmlns:a16="http://schemas.microsoft.com/office/drawing/2014/main" id="{358F1ADB-F7A9-E094-30A1-7500CD47B415}"/>
+          <p:cNvPr id="6" name="Rettangolo con angoli arrotondati 5">
+            <a:extLst>
+              <a:ext uri="{FF2B5EF4-FFF2-40B4-BE49-F238E27FC236}">
+                <a16:creationId xmlns:a16="http://schemas.microsoft.com/office/drawing/2014/main" id="{AC08D5D6-685C-AB9B-382F-CF4550838C3E}"/>
               </a:ext>
             </a:extLst>
           </p:cNvPr>
@@ -17726,8 +17788,8 @@
         </p:nvSpPr>
         <p:spPr>
           <a:xfrm>
-            <a:off x="838200" y="5038344"/>
-            <a:ext cx="2057400" cy="1188720"/>
+            <a:off x="838200" y="5449824"/>
+            <a:ext cx="2057400" cy="777240"/>
           </a:xfrm>
           <a:prstGeom prst="roundRect">
             <a:avLst/>
@@ -17755,10 +17817,10 @@
             <a:r>
               <a:rPr lang="en-GB" sz="1200" dirty="0">
                 <a:solidFill>
-                  <a:srgbClr val="0070C0"/>
+                  <a:schemeClr val="accent6"/>
                 </a:solidFill>
               </a:rPr>
-              <a:t>Blue boxes</a:t>
+              <a:t>Green boxes </a:t>
             </a:r>
             <a:r>
               <a:rPr lang="en-GB" sz="1200" dirty="0">
@@ -17766,31 +17828,15 @@
                   <a:srgbClr val="19232D"/>
                 </a:solidFill>
               </a:rPr>
-              <a:t>: MAP A atrial peak threshold, </a:t>
+              <a:t>: MAP A atrial peak threshold,</a:t>
             </a:r>
             <a:r>
               <a:rPr lang="en-GB" sz="1200" dirty="0">
                 <a:solidFill>
-                  <a:schemeClr val="accent6"/>
+                  <a:srgbClr val="FF0000"/>
                 </a:solidFill>
               </a:rPr>
-              <a:t>green boxes </a:t>
-            </a:r>
-            <a:r>
-              <a:rPr lang="en-GB" sz="1200" dirty="0">
-                <a:solidFill>
-                  <a:srgbClr val="19232D"/>
-                </a:solidFill>
-              </a:rPr>
-              <a:t>MAP B atrial threshold</a:t>
-            </a:r>
-            <a:r>
-              <a:rPr lang="en-GB" sz="1200" dirty="0">
-                <a:solidFill>
-                  <a:srgbClr val="FF0000"/>
-                </a:solidFill>
-              </a:rPr>
-              <a:t>, red dashed lines</a:t>
+              <a:t> red dashed lines</a:t>
             </a:r>
             <a:r>
               <a:rPr lang="en-GB" sz="1200" dirty="0">
@@ -17869,7 +17915,7 @@
           <a:p>
             <a:r>
               <a:rPr lang="en-US" sz="3600" dirty="0"/>
-              <a:t>Misclassified example 1</a:t>
+              <a:t>Misclassified from both strategies: example 1</a:t>
             </a:r>
           </a:p>
         </p:txBody>
@@ -18161,7 +18207,7 @@
         <p:spPr>
           <a:xfrm>
             <a:off x="5138929" y="1629738"/>
-            <a:ext cx="6138682" cy="4063585"/>
+            <a:ext cx="6138681" cy="4063585"/>
           </a:xfrm>
           <a:prstGeom prst="rect">
             <a:avLst/>
@@ -18170,10 +18216,10 @@
       </p:pic>
       <p:sp>
         <p:nvSpPr>
-          <p:cNvPr id="3" name="Rettangolo con angoli arrotondati 2">
-            <a:extLst>
-              <a:ext uri="{FF2B5EF4-FFF2-40B4-BE49-F238E27FC236}">
-                <a16:creationId xmlns:a16="http://schemas.microsoft.com/office/drawing/2014/main" id="{CCAEC923-6F74-2CFA-C853-978AE88D0D62}"/>
+          <p:cNvPr id="5" name="Rettangolo con angoli arrotondati 4">
+            <a:extLst>
+              <a:ext uri="{FF2B5EF4-FFF2-40B4-BE49-F238E27FC236}">
+                <a16:creationId xmlns:a16="http://schemas.microsoft.com/office/drawing/2014/main" id="{1804F9F8-99AE-2C96-A2F2-4762FA5E3FE4}"/>
               </a:ext>
             </a:extLst>
           </p:cNvPr>
@@ -18182,8 +18228,8 @@
         </p:nvSpPr>
         <p:spPr>
           <a:xfrm>
-            <a:off x="838200" y="5038344"/>
-            <a:ext cx="2057400" cy="1188720"/>
+            <a:off x="838200" y="5449824"/>
+            <a:ext cx="2057400" cy="777240"/>
           </a:xfrm>
           <a:prstGeom prst="roundRect">
             <a:avLst/>
@@ -18211,10 +18257,10 @@
             <a:r>
               <a:rPr lang="en-GB" sz="1200" dirty="0">
                 <a:solidFill>
-                  <a:srgbClr val="0070C0"/>
+                  <a:schemeClr val="accent6"/>
                 </a:solidFill>
               </a:rPr>
-              <a:t>Blue boxes</a:t>
+              <a:t>Green boxes </a:t>
             </a:r>
             <a:r>
               <a:rPr lang="en-GB" sz="1200" dirty="0">
@@ -18222,31 +18268,15 @@
                   <a:srgbClr val="19232D"/>
                 </a:solidFill>
               </a:rPr>
-              <a:t>: MAP A atrial peak threshold, </a:t>
+              <a:t>: MAP A atrial peak threshold,</a:t>
             </a:r>
             <a:r>
               <a:rPr lang="en-GB" sz="1200" dirty="0">
                 <a:solidFill>
-                  <a:schemeClr val="accent6"/>
+                  <a:srgbClr val="FF0000"/>
                 </a:solidFill>
               </a:rPr>
-              <a:t>green boxes </a:t>
-            </a:r>
-            <a:r>
-              <a:rPr lang="en-GB" sz="1200" dirty="0">
-                <a:solidFill>
-                  <a:srgbClr val="19232D"/>
-                </a:solidFill>
-              </a:rPr>
-              <a:t>MAP B atrial threshold</a:t>
-            </a:r>
-            <a:r>
-              <a:rPr lang="en-GB" sz="1200" dirty="0">
-                <a:solidFill>
-                  <a:srgbClr val="FF0000"/>
-                </a:solidFill>
-              </a:rPr>
-              <a:t>, red dashed lines</a:t>
+              <a:t> red dashed lines</a:t>
             </a:r>
             <a:r>
               <a:rPr lang="en-GB" sz="1200" dirty="0">
@@ -18325,7 +18355,7 @@
           <a:p>
             <a:r>
               <a:rPr lang="en-US" sz="3600" dirty="0"/>
-              <a:t>Misclassified example 2</a:t>
+              <a:t>Misclassified from both strategies: example 2</a:t>
             </a:r>
           </a:p>
         </p:txBody>
@@ -18620,7 +18650,7 @@
         <p:spPr>
           <a:xfrm>
             <a:off x="5235132" y="1658746"/>
-            <a:ext cx="5998472" cy="3970771"/>
+            <a:ext cx="5998471" cy="3970771"/>
           </a:xfrm>
           <a:prstGeom prst="rect">
             <a:avLst/>
@@ -18629,10 +18659,10 @@
       </p:pic>
       <p:sp>
         <p:nvSpPr>
-          <p:cNvPr id="7" name="Rettangolo con angoli arrotondati 6">
-            <a:extLst>
-              <a:ext uri="{FF2B5EF4-FFF2-40B4-BE49-F238E27FC236}">
-                <a16:creationId xmlns:a16="http://schemas.microsoft.com/office/drawing/2014/main" id="{28203719-2B97-29CD-5DB8-0F3D98901D3F}"/>
+          <p:cNvPr id="3" name="Rettangolo con angoli arrotondati 2">
+            <a:extLst>
+              <a:ext uri="{FF2B5EF4-FFF2-40B4-BE49-F238E27FC236}">
+                <a16:creationId xmlns:a16="http://schemas.microsoft.com/office/drawing/2014/main" id="{FA4AAE15-0629-2706-7D1A-27B1F4D1EB8A}"/>
               </a:ext>
             </a:extLst>
           </p:cNvPr>
@@ -18641,8 +18671,8 @@
         </p:nvSpPr>
         <p:spPr>
           <a:xfrm>
-            <a:off x="838200" y="5038344"/>
-            <a:ext cx="2057400" cy="1188720"/>
+            <a:off x="838200" y="5449824"/>
+            <a:ext cx="2057400" cy="777240"/>
           </a:xfrm>
           <a:prstGeom prst="roundRect">
             <a:avLst/>
@@ -18670,10 +18700,10 @@
             <a:r>
               <a:rPr lang="en-GB" sz="1200" dirty="0">
                 <a:solidFill>
-                  <a:srgbClr val="0070C0"/>
+                  <a:schemeClr val="accent6"/>
                 </a:solidFill>
               </a:rPr>
-              <a:t>Blue boxes</a:t>
+              <a:t>Green boxes </a:t>
             </a:r>
             <a:r>
               <a:rPr lang="en-GB" sz="1200" dirty="0">
@@ -18681,31 +18711,15 @@
                   <a:srgbClr val="19232D"/>
                 </a:solidFill>
               </a:rPr>
-              <a:t>: MAP A atrial peak threshold, </a:t>
+              <a:t>: MAP A atrial peak threshold,</a:t>
             </a:r>
             <a:r>
               <a:rPr lang="en-GB" sz="1200" dirty="0">
                 <a:solidFill>
-                  <a:schemeClr val="accent6"/>
+                  <a:srgbClr val="FF0000"/>
                 </a:solidFill>
               </a:rPr>
-              <a:t>green boxes </a:t>
-            </a:r>
-            <a:r>
-              <a:rPr lang="en-GB" sz="1200" dirty="0">
-                <a:solidFill>
-                  <a:srgbClr val="19232D"/>
-                </a:solidFill>
-              </a:rPr>
-              <a:t>MAP B atrial threshold</a:t>
-            </a:r>
-            <a:r>
-              <a:rPr lang="en-GB" sz="1200" dirty="0">
-                <a:solidFill>
-                  <a:srgbClr val="FF0000"/>
-                </a:solidFill>
-              </a:rPr>
-              <a:t>, red dashed lines</a:t>
+              <a:t> red dashed lines</a:t>
             </a:r>
             <a:r>
               <a:rPr lang="en-GB" sz="1200" dirty="0">
@@ -18784,7 +18798,7 @@
           <a:p>
             <a:r>
               <a:rPr lang="en-US" sz="3600" dirty="0"/>
-              <a:t>Misclassified example 3</a:t>
+              <a:t>Misclassified from both strategies: example 3</a:t>
             </a:r>
           </a:p>
         </p:txBody>
@@ -19079,7 +19093,7 @@
         <p:spPr>
           <a:xfrm>
             <a:off x="5788152" y="1628928"/>
-            <a:ext cx="5794529" cy="3835768"/>
+            <a:ext cx="5794528" cy="3835768"/>
           </a:xfrm>
           <a:prstGeom prst="rect">
             <a:avLst/>
@@ -19088,10 +19102,10 @@
       </p:pic>
       <p:sp>
         <p:nvSpPr>
-          <p:cNvPr id="3" name="Rettangolo con angoli arrotondati 2">
-            <a:extLst>
-              <a:ext uri="{FF2B5EF4-FFF2-40B4-BE49-F238E27FC236}">
-                <a16:creationId xmlns:a16="http://schemas.microsoft.com/office/drawing/2014/main" id="{D2D539D0-D34A-BA70-C059-AA437794253F}"/>
+          <p:cNvPr id="5" name="Rettangolo con angoli arrotondati 4">
+            <a:extLst>
+              <a:ext uri="{FF2B5EF4-FFF2-40B4-BE49-F238E27FC236}">
+                <a16:creationId xmlns:a16="http://schemas.microsoft.com/office/drawing/2014/main" id="{B71BEEDC-17EF-4674-80A4-6F7AA7F5AB4C}"/>
               </a:ext>
             </a:extLst>
           </p:cNvPr>
@@ -19100,8 +19114,8 @@
         </p:nvSpPr>
         <p:spPr>
           <a:xfrm>
-            <a:off x="838200" y="5038344"/>
-            <a:ext cx="2057400" cy="1188720"/>
+            <a:off x="838200" y="5449824"/>
+            <a:ext cx="2057400" cy="777240"/>
           </a:xfrm>
           <a:prstGeom prst="roundRect">
             <a:avLst/>
@@ -19129,10 +19143,10 @@
             <a:r>
               <a:rPr lang="en-GB" sz="1200" dirty="0">
                 <a:solidFill>
-                  <a:srgbClr val="0070C0"/>
+                  <a:schemeClr val="accent6"/>
                 </a:solidFill>
               </a:rPr>
-              <a:t>Blue boxes</a:t>
+              <a:t>Green boxes </a:t>
             </a:r>
             <a:r>
               <a:rPr lang="en-GB" sz="1200" dirty="0">
@@ -19140,31 +19154,15 @@
                   <a:srgbClr val="19232D"/>
                 </a:solidFill>
               </a:rPr>
-              <a:t>: MAP A atrial peak threshold, </a:t>
+              <a:t>: MAP A atrial peak threshold,</a:t>
             </a:r>
             <a:r>
               <a:rPr lang="en-GB" sz="1200" dirty="0">
                 <a:solidFill>
-                  <a:schemeClr val="accent6"/>
+                  <a:srgbClr val="FF0000"/>
                 </a:solidFill>
               </a:rPr>
-              <a:t>green boxes </a:t>
-            </a:r>
-            <a:r>
-              <a:rPr lang="en-GB" sz="1200" dirty="0">
-                <a:solidFill>
-                  <a:srgbClr val="19232D"/>
-                </a:solidFill>
-              </a:rPr>
-              <a:t>MAP B atrial threshold</a:t>
-            </a:r>
-            <a:r>
-              <a:rPr lang="en-GB" sz="1200" dirty="0">
-                <a:solidFill>
-                  <a:srgbClr val="FF0000"/>
-                </a:solidFill>
-              </a:rPr>
-              <a:t>, red dashed lines</a:t>
+              <a:t> red dashed lines</a:t>
             </a:r>
             <a:r>
               <a:rPr lang="en-GB" sz="1200" dirty="0">
@@ -19693,19 +19691,45 @@
             </a:r>
             <a:r>
               <a:rPr lang="en-US" sz="1600" dirty="0"/>
+              <a:t>has many misclassified into </a:t>
+            </a:r>
+            <a:r>
+              <a:rPr lang="en-US" sz="1600" b="1" dirty="0">
+                <a:solidFill>
+                  <a:srgbClr val="00B050"/>
+                </a:solidFill>
+              </a:rPr>
+              <a:t>MAP B</a:t>
+            </a:r>
+            <a:r>
+              <a:rPr lang="en-US" sz="1600" dirty="0"/>
+              <a:t>. Atrial/Ventricular peak ratio improves performances, while the threshold on atrial wave leads to misleading results.</a:t>
+            </a:r>
+          </a:p>
+          <a:p>
+            <a:r>
+              <a:rPr lang="en-US" sz="1600" b="1" dirty="0">
+                <a:solidFill>
+                  <a:srgbClr val="FF0000"/>
+                </a:solidFill>
+              </a:rPr>
+              <a:t>MAP C</a:t>
+            </a:r>
+            <a:r>
+              <a:rPr lang="en-US" sz="1600" dirty="0">
+                <a:solidFill>
+                  <a:srgbClr val="FF0000"/>
+                </a:solidFill>
+              </a:rPr>
+              <a:t> </a:t>
+            </a:r>
+            <a:r>
+              <a:rPr lang="en-US" sz="1600" dirty="0"/>
               <a:t>has </a:t>
             </a:r>
             <a:r>
               <a:rPr lang="en-US" sz="1600" b="1" dirty="0"/>
-              <a:t>many FN</a:t>
-            </a:r>
-            <a:r>
-              <a:rPr lang="en-US" sz="1600" dirty="0"/>
-              <a:t> classified as </a:t>
-            </a:r>
-            <a:r>
-              <a:rPr lang="en-US" sz="1600" b="1" dirty="0"/>
-              <a:t>MAP</a:t>
+              <a:t>low</a:t>
             </a:r>
             <a:r>
               <a:rPr lang="en-US" sz="1600" dirty="0"/>
@@ -19713,15 +19737,23 @@
             </a:r>
             <a:r>
               <a:rPr lang="en-US" sz="1600" b="1" dirty="0"/>
-              <a:t>B</a:t>
+              <a:t>precision</a:t>
             </a:r>
             <a:r>
               <a:rPr lang="en-US" sz="1600" dirty="0"/>
-              <a:t>, probably due to ambiguous signals present into this class. Only temporal-spatial information is not sufficient to classify these signals properly. This situation is reflected by the </a:t>
+              <a:t> and </a:t>
             </a:r>
             <a:r>
               <a:rPr lang="en-US" sz="1600" b="1" dirty="0"/>
-              <a:t>good</a:t>
+              <a:t>recall</a:t>
+            </a:r>
+            <a:r>
+              <a:rPr lang="en-US" sz="1600" dirty="0"/>
+              <a:t>, leading to the conclusion that the threshold comparison result could be seen as a </a:t>
+            </a:r>
+            <a:r>
+              <a:rPr lang="en-US" sz="1600" b="1" dirty="0"/>
+              <a:t>first</a:t>
             </a:r>
             <a:r>
               <a:rPr lang="en-US" sz="1600" dirty="0"/>
@@ -19729,231 +19761,34 @@
             </a:r>
             <a:r>
               <a:rPr lang="en-US" sz="1600" b="1" dirty="0"/>
-              <a:t>precision</a:t>
+              <a:t>hint</a:t>
             </a:r>
             <a:r>
               <a:rPr lang="en-US" sz="1600" dirty="0"/>
-              <a:t> </a:t>
-            </a:r>
-            <a:r>
-              <a:rPr lang="en-US" sz="1600" b="1" dirty="0"/>
-              <a:t>juxtaposed</a:t>
-            </a:r>
-            <a:r>
-              <a:rPr lang="en-US" sz="1600" dirty="0"/>
-              <a:t>, however with </a:t>
-            </a:r>
-            <a:r>
-              <a:rPr lang="en-US" sz="1600" b="1" dirty="0"/>
-              <a:t>low</a:t>
-            </a:r>
-            <a:r>
-              <a:rPr lang="en-US" sz="1600" dirty="0"/>
-              <a:t> </a:t>
-            </a:r>
-            <a:r>
-              <a:rPr lang="en-US" sz="1600" b="1" dirty="0"/>
-              <a:t>recall</a:t>
-            </a:r>
-            <a:r>
-              <a:rPr lang="en-US" sz="1600" dirty="0"/>
-              <a:t>.</a:t>
-            </a:r>
-          </a:p>
-          <a:p>
-            <a:r>
-              <a:rPr lang="en-US" sz="1600" b="1" dirty="0">
-                <a:solidFill>
-                  <a:srgbClr val="00B050"/>
-                </a:solidFill>
-              </a:rPr>
-              <a:t>MAP B</a:t>
-            </a:r>
-            <a:r>
-              <a:rPr lang="en-US" sz="1600" dirty="0">
-                <a:solidFill>
-                  <a:srgbClr val="00B050"/>
-                </a:solidFill>
-              </a:rPr>
-              <a:t> </a:t>
-            </a:r>
-            <a:r>
-              <a:rPr lang="en-US" sz="1600" dirty="0"/>
-              <a:t>il classified </a:t>
-            </a:r>
-            <a:r>
-              <a:rPr lang="en-US" sz="1600" b="1" dirty="0"/>
-              <a:t>well</a:t>
-            </a:r>
-            <a:r>
-              <a:rPr lang="en-US" sz="1600" dirty="0"/>
-              <a:t> in terms or </a:t>
-            </a:r>
-            <a:r>
-              <a:rPr lang="en-US" sz="1600" b="1" dirty="0"/>
-              <a:t>recall</a:t>
-            </a:r>
-            <a:r>
-              <a:rPr lang="en-US" sz="1600" dirty="0"/>
-              <a:t>, but </a:t>
-            </a:r>
-            <a:r>
-              <a:rPr lang="en-US" sz="1600" b="1" dirty="0"/>
-              <a:t>suffers</a:t>
-            </a:r>
-            <a:r>
-              <a:rPr lang="en-US" sz="1600" dirty="0"/>
-              <a:t> of very </a:t>
-            </a:r>
-            <a:r>
-              <a:rPr lang="en-US" sz="1600" b="1" dirty="0"/>
-              <a:t>low</a:t>
-            </a:r>
-            <a:r>
-              <a:rPr lang="en-US" sz="1600" dirty="0"/>
-              <a:t> </a:t>
-            </a:r>
-            <a:r>
-              <a:rPr lang="en-US" sz="1600" b="1" dirty="0"/>
-              <a:t>precision</a:t>
-            </a:r>
-            <a:r>
-              <a:rPr lang="en-US" sz="1600" dirty="0"/>
-              <a:t>, because of the presence MAP A misclassified signals. </a:t>
-            </a:r>
-          </a:p>
-          <a:p>
-            <a:r>
-              <a:rPr lang="en-US" sz="1600" b="1" dirty="0">
-                <a:solidFill>
-                  <a:srgbClr val="FF0000"/>
-                </a:solidFill>
-              </a:rPr>
-              <a:t>MAP C</a:t>
-            </a:r>
-            <a:r>
-              <a:rPr lang="en-US" sz="1600" dirty="0">
-                <a:solidFill>
-                  <a:srgbClr val="FF0000"/>
-                </a:solidFill>
-              </a:rPr>
-              <a:t> </a:t>
-            </a:r>
-            <a:r>
-              <a:rPr lang="en-US" sz="1600" dirty="0"/>
-              <a:t>has </a:t>
-            </a:r>
-            <a:r>
-              <a:rPr lang="en-US" sz="1600" b="1" dirty="0"/>
-              <a:t>low</a:t>
-            </a:r>
-            <a:r>
-              <a:rPr lang="en-US" sz="1600" dirty="0"/>
-              <a:t> </a:t>
-            </a:r>
-            <a:r>
-              <a:rPr lang="en-US" sz="1600" b="1" dirty="0"/>
-              <a:t>precision</a:t>
-            </a:r>
-            <a:r>
-              <a:rPr lang="en-US" sz="1600" dirty="0"/>
-              <a:t> and </a:t>
-            </a:r>
-            <a:r>
-              <a:rPr lang="en-US" sz="1600" b="1" dirty="0"/>
-              <a:t>recall</a:t>
-            </a:r>
-            <a:r>
-              <a:rPr lang="en-US" sz="1600" dirty="0"/>
-              <a:t>, but at least </a:t>
-            </a:r>
-            <a:r>
-              <a:rPr lang="en-US" sz="1600" b="1" dirty="0"/>
-              <a:t>half</a:t>
-            </a:r>
-            <a:r>
-              <a:rPr lang="en-US" sz="1600" dirty="0"/>
-              <a:t> signals are </a:t>
-            </a:r>
-            <a:r>
-              <a:rPr lang="en-US" sz="1600" b="1" dirty="0"/>
-              <a:t>correctly</a:t>
-            </a:r>
-            <a:r>
-              <a:rPr lang="en-US" sz="1600" dirty="0"/>
-              <a:t> </a:t>
-            </a:r>
-            <a:r>
-              <a:rPr lang="en-US" sz="1600" b="1" dirty="0"/>
-              <a:t>classified</a:t>
-            </a:r>
-            <a:r>
-              <a:rPr lang="en-US" sz="1600" dirty="0"/>
-              <a:t>, leading to the conclusion that the threshold comparison result could be seen as a </a:t>
-            </a:r>
-            <a:r>
-              <a:rPr lang="en-US" sz="1600" b="1" dirty="0"/>
-              <a:t>first</a:t>
-            </a:r>
-            <a:r>
-              <a:rPr lang="en-US" sz="1600" dirty="0"/>
-              <a:t> </a:t>
-            </a:r>
-            <a:r>
-              <a:rPr lang="en-US" sz="1600" b="1" dirty="0"/>
-              <a:t>hint</a:t>
-            </a:r>
-            <a:r>
-              <a:rPr lang="en-US" sz="1600" dirty="0"/>
-              <a:t> to recognize these signals, even if clearly not sufficient. </a:t>
-            </a:r>
-            <a:endParaRPr lang="en-US" sz="1600" b="1" dirty="0"/>
-          </a:p>
-          <a:p>
-            <a:pPr marL="0" indent="0">
-              <a:buNone/>
-            </a:pPr>
+              <a:t> to recognize these signals, but not sufficient. </a:t>
+            </a:r>
+          </a:p>
+          <a:p>
+            <a:pPr lvl="1"/>
+            <a:r>
+              <a:rPr lang="en-US" sz="1400" dirty="0"/>
+              <a:t>An improvement can be considering a measure of noise of the signal and computing the His peak/noise ratio to assess if the peak is present.</a:t>
+            </a:r>
             <a:endParaRPr lang="en-US" sz="1600" dirty="0"/>
           </a:p>
           <a:p>
-            <a:pPr marL="0" indent="0">
-              <a:buNone/>
-            </a:pPr>
             <a:r>
               <a:rPr lang="en-US" sz="1600" dirty="0"/>
               <a:t>The most important advantage of this algorithm is the </a:t>
             </a:r>
             <a:r>
               <a:rPr lang="en-US" sz="1600" b="1" dirty="0"/>
-              <a:t>full explainability of the process</a:t>
+              <a:t>full explainability of the decisional process</a:t>
             </a:r>
             <a:r>
               <a:rPr lang="en-US" sz="1600" dirty="0"/>
-              <a:t>. In fact, the significance of the His Bundle peak can be easily explained, differently from what happened when </a:t>
-            </a:r>
-            <a:r>
-              <a:rPr lang="en-US" sz="1600" i="1" dirty="0"/>
-              <a:t>built-in </a:t>
-            </a:r>
-            <a:r>
-              <a:rPr lang="en-US" sz="1600" dirty="0"/>
-              <a:t>functions.</a:t>
-            </a:r>
-          </a:p>
-          <a:p>
-            <a:pPr marL="0" indent="0">
-              <a:buNone/>
-            </a:pPr>
-            <a:r>
-              <a:rPr lang="en-US" sz="1600" dirty="0"/>
-              <a:t>In conclusion the presented set of rules is a simple classifier, which can be used as baseline to start the classification with a true machine learning model.</a:t>
-            </a:r>
-          </a:p>
-          <a:p>
-            <a:pPr marL="0" indent="0">
-              <a:buNone/>
-            </a:pPr>
-            <a:endParaRPr lang="en-US" sz="1600" dirty="0"/>
+              <a:t>. </a:t>
+            </a:r>
           </a:p>
         </p:txBody>
       </p:sp>
@@ -19978,7 +19813,7 @@
         <p:cNvPr id="1" name="">
           <a:extLst>
             <a:ext uri="{FF2B5EF4-FFF2-40B4-BE49-F238E27FC236}">
-              <a16:creationId xmlns:a16="http://schemas.microsoft.com/office/drawing/2014/main" id="{FC37D0A5-2052-D67C-358D-EF6B12467E50}"/>
+              <a16:creationId xmlns:a16="http://schemas.microsoft.com/office/drawing/2014/main" id="{DCD38FC0-319D-1411-DFE3-DB70740A5197}"/>
             </a:ext>
           </a:extLst>
         </p:cNvPr>
@@ -19998,7 +19833,7 @@
           <p:cNvPr id="2" name="Titolo 1">
             <a:extLst>
               <a:ext uri="{FF2B5EF4-FFF2-40B4-BE49-F238E27FC236}">
-                <a16:creationId xmlns:a16="http://schemas.microsoft.com/office/drawing/2014/main" id="{CDD0FFFD-7CBF-17A4-5EF1-ACD5F1BA0EE0}"/>
+                <a16:creationId xmlns:a16="http://schemas.microsoft.com/office/drawing/2014/main" id="{F282AAA0-BD28-D299-8465-AD2A16E31E73}"/>
               </a:ext>
             </a:extLst>
           </p:cNvPr>
@@ -20009,24 +19844,168 @@
             <p:ph type="title"/>
           </p:nvPr>
         </p:nvSpPr>
+        <p:spPr>
+          <a:xfrm>
+            <a:off x="838200" y="209292"/>
+            <a:ext cx="9905460" cy="971551"/>
+          </a:xfrm>
+        </p:spPr>
+        <p:txBody>
+          <a:bodyPr>
+            <a:normAutofit/>
+          </a:bodyPr>
+          <a:lstStyle/>
+          <a:p>
+            <a:r>
+              <a:rPr lang="en-US" sz="3600" dirty="0"/>
+              <a:t>Conclusions</a:t>
+            </a:r>
+          </a:p>
+        </p:txBody>
+      </p:sp>
+      <p:sp>
+        <p:nvSpPr>
+          <p:cNvPr id="4" name="Segnaposto numero diapositiva 3">
+            <a:extLst>
+              <a:ext uri="{FF2B5EF4-FFF2-40B4-BE49-F238E27FC236}">
+                <a16:creationId xmlns:a16="http://schemas.microsoft.com/office/drawing/2014/main" id="{F1ABC241-B422-CBA1-F53D-D68BEE7832E4}"/>
+              </a:ext>
+            </a:extLst>
+          </p:cNvPr>
+          <p:cNvSpPr>
+            <a:spLocks noGrp="1"/>
+          </p:cNvSpPr>
+          <p:nvPr>
+            <p:ph type="sldNum" sz="quarter" idx="12"/>
+          </p:nvPr>
+        </p:nvSpPr>
         <p:spPr/>
         <p:txBody>
           <a:bodyPr/>
           <a:lstStyle/>
           <a:p>
-            <a:r>
-              <a:rPr lang="en-US" dirty="0"/>
-              <a:t>Outline </a:t>
-            </a:r>
-          </a:p>
-        </p:txBody>
-      </p:sp>
-      <p:sp>
-        <p:nvSpPr>
-          <p:cNvPr id="3" name="Segnaposto contenuto 2">
-            <a:extLst>
-              <a:ext uri="{FF2B5EF4-FFF2-40B4-BE49-F238E27FC236}">
-                <a16:creationId xmlns:a16="http://schemas.microsoft.com/office/drawing/2014/main" id="{968ADCB4-F164-93EC-E97A-39A2276E4834}"/>
+            <a:fld id="{2FA0223F-D95A-431D-9A71-EDA7FA0C2F5B}" type="slidenum">
+              <a:rPr lang="en-US" smtClean="0"/>
+              <a:t>29</a:t>
+            </a:fld>
+            <a:endParaRPr lang="en-US"/>
+          </a:p>
+        </p:txBody>
+      </p:sp>
+      <p:sp>
+        <p:nvSpPr>
+          <p:cNvPr id="27" name="Rettangolo 26">
+            <a:extLst>
+              <a:ext uri="{FF2B5EF4-FFF2-40B4-BE49-F238E27FC236}">
+                <a16:creationId xmlns:a16="http://schemas.microsoft.com/office/drawing/2014/main" id="{713CD47B-32F6-74CA-84A3-2EBA782737C3}"/>
+              </a:ext>
+            </a:extLst>
+          </p:cNvPr>
+          <p:cNvSpPr/>
+          <p:nvPr/>
+        </p:nvSpPr>
+        <p:spPr>
+          <a:xfrm>
+            <a:off x="6723157" y="1812745"/>
+            <a:ext cx="206547" cy="168094"/>
+          </a:xfrm>
+          <a:prstGeom prst="rect">
+            <a:avLst/>
+          </a:prstGeom>
+          <a:solidFill>
+            <a:schemeClr val="bg1"/>
+          </a:solidFill>
+          <a:ln>
+            <a:solidFill>
+              <a:schemeClr val="bg1"/>
+            </a:solidFill>
+          </a:ln>
+        </p:spPr>
+        <p:style>
+          <a:lnRef idx="2">
+            <a:schemeClr val="accent1">
+              <a:shade val="15000"/>
+            </a:schemeClr>
+          </a:lnRef>
+          <a:fillRef idx="1">
+            <a:schemeClr val="accent1"/>
+          </a:fillRef>
+          <a:effectRef idx="0">
+            <a:schemeClr val="accent1"/>
+          </a:effectRef>
+          <a:fontRef idx="minor">
+            <a:schemeClr val="lt1"/>
+          </a:fontRef>
+        </p:style>
+        <p:txBody>
+          <a:bodyPr rtlCol="0" anchor="ctr"/>
+          <a:lstStyle/>
+          <a:p>
+            <a:pPr algn="ctr"/>
+            <a:endParaRPr lang="it-IT"/>
+          </a:p>
+        </p:txBody>
+      </p:sp>
+      <p:sp>
+        <p:nvSpPr>
+          <p:cNvPr id="12" name="Rettangolo 11">
+            <a:extLst>
+              <a:ext uri="{FF2B5EF4-FFF2-40B4-BE49-F238E27FC236}">
+                <a16:creationId xmlns:a16="http://schemas.microsoft.com/office/drawing/2014/main" id="{A88AAB89-FB0B-C275-ABB2-8BF75C3C0821}"/>
+              </a:ext>
+            </a:extLst>
+          </p:cNvPr>
+          <p:cNvSpPr/>
+          <p:nvPr/>
+        </p:nvSpPr>
+        <p:spPr>
+          <a:xfrm>
+            <a:off x="5468844" y="2179320"/>
+            <a:ext cx="223296" cy="160020"/>
+          </a:xfrm>
+          <a:prstGeom prst="rect">
+            <a:avLst/>
+          </a:prstGeom>
+          <a:solidFill>
+            <a:schemeClr val="bg1"/>
+          </a:solidFill>
+          <a:ln>
+            <a:solidFill>
+              <a:schemeClr val="bg1"/>
+            </a:solidFill>
+          </a:ln>
+        </p:spPr>
+        <p:style>
+          <a:lnRef idx="2">
+            <a:schemeClr val="accent1">
+              <a:shade val="15000"/>
+            </a:schemeClr>
+          </a:lnRef>
+          <a:fillRef idx="1">
+            <a:schemeClr val="accent1"/>
+          </a:fillRef>
+          <a:effectRef idx="0">
+            <a:schemeClr val="accent1"/>
+          </a:effectRef>
+          <a:fontRef idx="minor">
+            <a:schemeClr val="lt1"/>
+          </a:fontRef>
+        </p:style>
+        <p:txBody>
+          <a:bodyPr rtlCol="0" anchor="ctr"/>
+          <a:lstStyle/>
+          <a:p>
+            <a:pPr algn="ctr"/>
+            <a:endParaRPr lang="it-IT"/>
+          </a:p>
+        </p:txBody>
+      </p:sp>
+      <p:sp>
+        <p:nvSpPr>
+          <p:cNvPr id="9" name="Segnaposto contenuto 2">
+            <a:extLst>
+              <a:ext uri="{FF2B5EF4-FFF2-40B4-BE49-F238E27FC236}">
+                <a16:creationId xmlns:a16="http://schemas.microsoft.com/office/drawing/2014/main" id="{E1521B3E-5FB3-E1C7-BBDE-238C93494CE2}"/>
               </a:ext>
             </a:extLst>
           </p:cNvPr>
@@ -20039,8 +20018,8 @@
         </p:nvSpPr>
         <p:spPr>
           <a:xfrm>
-            <a:off x="664464" y="2041497"/>
-            <a:ext cx="10098024" cy="2613436"/>
+            <a:off x="607277" y="1606160"/>
+            <a:ext cx="3525811" cy="4575184"/>
           </a:xfrm>
         </p:spPr>
         <p:txBody>
@@ -20049,137 +20028,764 @@
           </a:bodyPr>
           <a:lstStyle/>
           <a:p>
-            <a:r>
-              <a:rPr lang="en-US" sz="2000" dirty="0">
-                <a:solidFill>
-                  <a:schemeClr val="bg1">
-                    <a:lumMod val="65000"/>
-                  </a:schemeClr>
-                </a:solidFill>
-              </a:rPr>
-              <a:t>Why building a heuristic classifier</a:t>
-            </a:r>
-          </a:p>
-          <a:p>
-            <a:r>
-              <a:rPr lang="en-US" sz="2000" dirty="0">
-                <a:solidFill>
-                  <a:schemeClr val="bg1">
-                    <a:lumMod val="65000"/>
-                  </a:schemeClr>
-                </a:solidFill>
-              </a:rPr>
-              <a:t>Knowledge on roving signals: recap</a:t>
-            </a:r>
-          </a:p>
-          <a:p>
-            <a:r>
-              <a:rPr lang="en-US" sz="2000" dirty="0">
-                <a:solidFill>
-                  <a:schemeClr val="bg1">
-                    <a:lumMod val="65000"/>
-                  </a:schemeClr>
-                </a:solidFill>
-              </a:rPr>
-              <a:t>Data preparation</a:t>
-            </a:r>
-          </a:p>
-          <a:p>
-            <a:r>
-              <a:rPr lang="en-US" sz="2000" dirty="0">
-                <a:solidFill>
-                  <a:schemeClr val="bg1">
-                    <a:lumMod val="65000"/>
-                  </a:schemeClr>
-                </a:solidFill>
-              </a:rPr>
-              <a:t>Heuristic classifier: pseudo code</a:t>
-            </a:r>
-          </a:p>
-          <a:p>
-            <a:r>
-              <a:rPr lang="en-US" sz="2000" dirty="0">
-                <a:solidFill>
-                  <a:schemeClr val="bg1">
-                    <a:lumMod val="65000"/>
-                  </a:schemeClr>
-                </a:solidFill>
-              </a:rPr>
-              <a:t>Performance</a:t>
-            </a:r>
-          </a:p>
-          <a:p>
-            <a:r>
-              <a:rPr lang="en-US" sz="2000" dirty="0">
-                <a:solidFill>
-                  <a:schemeClr val="bg1">
-                    <a:lumMod val="65000"/>
-                  </a:schemeClr>
-                </a:solidFill>
-              </a:rPr>
-              <a:t>Conclusions </a:t>
-            </a:r>
-          </a:p>
-          <a:p>
-            <a:r>
-              <a:rPr lang="en-US" sz="2000" dirty="0"/>
-              <a:t>Appendices</a:t>
-            </a:r>
-            <a:endParaRPr lang="en-US" sz="1600" dirty="0"/>
-          </a:p>
-          <a:p>
             <a:pPr marL="0" indent="0">
               <a:buNone/>
             </a:pPr>
-            <a:endParaRPr lang="en-US" sz="1600" dirty="0">
-              <a:solidFill>
-                <a:schemeClr val="bg1">
-                  <a:lumMod val="65000"/>
-                </a:schemeClr>
-              </a:solidFill>
-            </a:endParaRPr>
-          </a:p>
-        </p:txBody>
-      </p:sp>
-      <p:sp>
-        <p:nvSpPr>
-          <p:cNvPr id="4" name="Segnaposto numero diapositiva 3">
-            <a:extLst>
-              <a:ext uri="{FF2B5EF4-FFF2-40B4-BE49-F238E27FC236}">
-                <a16:creationId xmlns:a16="http://schemas.microsoft.com/office/drawing/2014/main" id="{795A8999-4998-8938-5248-544525BED9C7}"/>
-              </a:ext>
-            </a:extLst>
-          </p:cNvPr>
-          <p:cNvSpPr>
-            <a:spLocks noGrp="1"/>
-          </p:cNvSpPr>
-          <p:nvPr>
-            <p:ph type="sldNum" sz="quarter" idx="12"/>
-          </p:nvPr>
-        </p:nvSpPr>
-        <p:spPr/>
-        <p:txBody>
-          <a:bodyPr/>
-          <a:lstStyle/>
-          <a:p>
-            <a:fld id="{2FA0223F-D95A-431D-9A71-EDA7FA0C2F5B}" type="slidenum">
-              <a:rPr lang="en-US" smtClean="0"/>
-              <a:t>29</a:t>
-            </a:fld>
-            <a:endParaRPr lang="en-US" dirty="0"/>
-          </a:p>
-        </p:txBody>
-      </p:sp>
+            <a:r>
+              <a:rPr lang="en-US" sz="1600" dirty="0"/>
+              <a:t>How could these results be improved?</a:t>
+            </a:r>
+          </a:p>
+          <a:p>
+            <a:pPr marL="342900" indent="-342900">
+              <a:buFont typeface="+mj-lt"/>
+              <a:buAutoNum type="arabicPeriod"/>
+            </a:pPr>
+            <a:r>
+              <a:rPr lang="en-US" sz="1600" dirty="0"/>
+              <a:t>Rectify the signal and compute its envelope to find the active portions </a:t>
+            </a:r>
+          </a:p>
+          <a:p>
+            <a:pPr marL="342900" indent="-342900">
+              <a:buFont typeface="+mj-lt"/>
+              <a:buAutoNum type="arabicPeriod"/>
+            </a:pPr>
+            <a:r>
+              <a:rPr lang="en-US" sz="1600" dirty="0"/>
+              <a:t>Using a template of a “biphasic wave” to compare with the signal and determine the portions of maximal similarity. A natural evolution of this technique is the Continuous Wavelet transform </a:t>
+            </a:r>
+          </a:p>
+          <a:p>
+            <a:pPr marL="342900" indent="-342900">
+              <a:buFont typeface="+mj-lt"/>
+              <a:buAutoNum type="arabicPeriod"/>
+            </a:pPr>
+            <a:r>
+              <a:rPr lang="en-US" sz="1600" dirty="0"/>
+              <a:t>Using time-frequency representations, like STFT or scalogram</a:t>
+            </a:r>
+          </a:p>
+        </p:txBody>
+      </p:sp>
+      <p:grpSp>
+        <p:nvGrpSpPr>
+          <p:cNvPr id="3" name="Gruppo 2">
+            <a:extLst>
+              <a:ext uri="{FF2B5EF4-FFF2-40B4-BE49-F238E27FC236}">
+                <a16:creationId xmlns:a16="http://schemas.microsoft.com/office/drawing/2014/main" id="{4F8FC254-7DB8-3712-EA19-792B28B48921}"/>
+              </a:ext>
+            </a:extLst>
+          </p:cNvPr>
+          <p:cNvGrpSpPr/>
+          <p:nvPr/>
+        </p:nvGrpSpPr>
+        <p:grpSpPr>
+          <a:xfrm>
+            <a:off x="5983226" y="1704975"/>
+            <a:ext cx="4227766" cy="3448050"/>
+            <a:chOff x="5983226" y="1704975"/>
+            <a:chExt cx="4227766" cy="3448050"/>
+          </a:xfrm>
+        </p:grpSpPr>
+        <p:pic>
+          <p:nvPicPr>
+            <p:cNvPr id="1026" name="Picture 2">
+              <a:extLst>
+                <a:ext uri="{FF2B5EF4-FFF2-40B4-BE49-F238E27FC236}">
+                  <a16:creationId xmlns:a16="http://schemas.microsoft.com/office/drawing/2014/main" id="{00AFB74A-DC0E-CFF7-0B5C-D65684D4320D}"/>
+                </a:ext>
+              </a:extLst>
+            </p:cNvPr>
+            <p:cNvPicPr>
+              <a:picLocks noChangeAspect="1" noChangeArrowheads="1"/>
+            </p:cNvPicPr>
+            <p:nvPr/>
+          </p:nvPicPr>
+          <p:blipFill rotWithShape="1">
+            <a:blip r:embed="rId3">
+              <a:extLst>
+                <a:ext uri="{28A0092B-C50C-407E-A947-70E740481C1C}">
+                  <a14:useLocalDpi xmlns:a14="http://schemas.microsoft.com/office/drawing/2010/main" val="0"/>
+                </a:ext>
+              </a:extLst>
+            </a:blip>
+            <a:srcRect r="48725"/>
+            <a:stretch/>
+          </p:blipFill>
+          <p:spPr bwMode="auto">
+            <a:xfrm>
+              <a:off x="5983226" y="1704975"/>
+              <a:ext cx="4151376" cy="1724025"/>
+            </a:xfrm>
+            <a:prstGeom prst="rect">
+              <a:avLst/>
+            </a:prstGeom>
+            <a:noFill/>
+            <a:extLst>
+              <a:ext uri="{909E8E84-426E-40DD-AFC4-6F175D3DCCD1}">
+                <a14:hiddenFill xmlns:a14="http://schemas.microsoft.com/office/drawing/2010/main">
+                  <a:solidFill>
+                    <a:srgbClr val="FFFFFF"/>
+                  </a:solidFill>
+                </a14:hiddenFill>
+              </a:ext>
+            </a:extLst>
+          </p:spPr>
+        </p:pic>
+        <p:pic>
+          <p:nvPicPr>
+            <p:cNvPr id="1028" name="Picture 4">
+              <a:extLst>
+                <a:ext uri="{FF2B5EF4-FFF2-40B4-BE49-F238E27FC236}">
+                  <a16:creationId xmlns:a16="http://schemas.microsoft.com/office/drawing/2014/main" id="{7F442CAA-4A65-B2BF-7B7B-05B18420A9A4}"/>
+                </a:ext>
+              </a:extLst>
+            </p:cNvPr>
+            <p:cNvPicPr>
+              <a:picLocks noChangeAspect="1" noChangeArrowheads="1"/>
+            </p:cNvPicPr>
+            <p:nvPr/>
+          </p:nvPicPr>
+          <p:blipFill rotWithShape="1">
+            <a:blip r:embed="rId3">
+              <a:extLst>
+                <a:ext uri="{28A0092B-C50C-407E-A947-70E740481C1C}">
+                  <a14:useLocalDpi xmlns:a14="http://schemas.microsoft.com/office/drawing/2010/main" val="0"/>
+                </a:ext>
+              </a:extLst>
+            </a:blip>
+            <a:srcRect l="51275" r="-1275"/>
+            <a:stretch/>
+          </p:blipFill>
+          <p:spPr bwMode="auto">
+            <a:xfrm>
+              <a:off x="6162867" y="3429000"/>
+              <a:ext cx="4048125" cy="1724025"/>
+            </a:xfrm>
+            <a:prstGeom prst="rect">
+              <a:avLst/>
+            </a:prstGeom>
+            <a:noFill/>
+            <a:extLst>
+              <a:ext uri="{909E8E84-426E-40DD-AFC4-6F175D3DCCD1}">
+                <a14:hiddenFill xmlns:a14="http://schemas.microsoft.com/office/drawing/2010/main">
+                  <a:solidFill>
+                    <a:srgbClr val="FFFFFF"/>
+                  </a:solidFill>
+                </a14:hiddenFill>
+              </a:ext>
+            </a:extLst>
+          </p:spPr>
+        </p:pic>
+      </p:grpSp>
+      <p:pic>
+        <p:nvPicPr>
+          <p:cNvPr id="7" name="Immagine 6" descr="Immagine che contiene calligrafia, linea, Arte bambini&#10;&#10;Descrizione generata automaticamente">
+            <a:extLst>
+              <a:ext uri="{FF2B5EF4-FFF2-40B4-BE49-F238E27FC236}">
+                <a16:creationId xmlns:a16="http://schemas.microsoft.com/office/drawing/2014/main" id="{5BCA793F-2FC9-3C66-DD88-CC3EC5EEBBD6}"/>
+              </a:ext>
+            </a:extLst>
+          </p:cNvPr>
+          <p:cNvPicPr>
+            <a:picLocks noChangeAspect="1"/>
+          </p:cNvPicPr>
+          <p:nvPr/>
+        </p:nvPicPr>
+        <p:blipFill>
+          <a:blip r:embed="rId4">
+            <a:extLst>
+              <a:ext uri="{28A0092B-C50C-407E-A947-70E740481C1C}">
+                <a14:useLocalDpi xmlns:a14="http://schemas.microsoft.com/office/drawing/2010/main" val="0"/>
+              </a:ext>
+            </a:extLst>
+          </a:blip>
+          <a:stretch>
+            <a:fillRect/>
+          </a:stretch>
+        </p:blipFill>
+        <p:spPr>
+          <a:xfrm>
+            <a:off x="5571746" y="1857739"/>
+            <a:ext cx="5262222" cy="2986311"/>
+          </a:xfrm>
+          <a:prstGeom prst="rect">
+            <a:avLst/>
+          </a:prstGeom>
+        </p:spPr>
+      </p:pic>
+      <p:pic>
+        <p:nvPicPr>
+          <p:cNvPr id="1032" name="Picture 8">
+            <a:extLst>
+              <a:ext uri="{FF2B5EF4-FFF2-40B4-BE49-F238E27FC236}">
+                <a16:creationId xmlns:a16="http://schemas.microsoft.com/office/drawing/2014/main" id="{0870D660-F97D-EFA0-D8D4-CC63B747C844}"/>
+              </a:ext>
+            </a:extLst>
+          </p:cNvPr>
+          <p:cNvPicPr>
+            <a:picLocks noChangeAspect="1" noChangeArrowheads="1"/>
+          </p:cNvPicPr>
+          <p:nvPr/>
+        </p:nvPicPr>
+        <p:blipFill>
+          <a:blip r:embed="rId5">
+            <a:extLst>
+              <a:ext uri="{28A0092B-C50C-407E-A947-70E740481C1C}">
+                <a14:useLocalDpi xmlns:a14="http://schemas.microsoft.com/office/drawing/2010/main" val="0"/>
+              </a:ext>
+            </a:extLst>
+          </a:blip>
+          <a:srcRect/>
+          <a:stretch>
+            <a:fillRect/>
+          </a:stretch>
+        </p:blipFill>
+        <p:spPr bwMode="auto">
+          <a:xfrm>
+            <a:off x="6283261" y="1563364"/>
+            <a:ext cx="3990140" cy="4402455"/>
+          </a:xfrm>
+          <a:prstGeom prst="rect">
+            <a:avLst/>
+          </a:prstGeom>
+          <a:noFill/>
+          <a:extLst>
+            <a:ext uri="{909E8E84-426E-40DD-AFC4-6F175D3DCCD1}">
+              <a14:hiddenFill xmlns:a14="http://schemas.microsoft.com/office/drawing/2010/main">
+                <a:solidFill>
+                  <a:srgbClr val="FFFFFF"/>
+                </a:solidFill>
+              </a14:hiddenFill>
+            </a:ext>
+          </a:extLst>
+        </p:spPr>
+      </p:pic>
     </p:spTree>
     <p:extLst>
       <p:ext uri="{BB962C8B-B14F-4D97-AF65-F5344CB8AC3E}">
-        <p14:creationId xmlns:p14="http://schemas.microsoft.com/office/powerpoint/2010/main" val="2986268060"/>
+        <p14:creationId xmlns:p14="http://schemas.microsoft.com/office/powerpoint/2010/main" val="2048981335"/>
       </p:ext>
     </p:extLst>
   </p:cSld>
   <p:clrMapOvr>
     <a:masterClrMapping/>
   </p:clrMapOvr>
+  <p:timing>
+    <p:tnLst>
+      <p:par>
+        <p:cTn id="1" dur="indefinite" restart="never" nodeType="tmRoot">
+          <p:childTnLst>
+            <p:seq concurrent="1" nextAc="seek">
+              <p:cTn id="2" dur="indefinite" nodeType="mainSeq">
+                <p:childTnLst>
+                  <p:par>
+                    <p:cTn id="3" fill="hold">
+                      <p:stCondLst>
+                        <p:cond delay="indefinite"/>
+                      </p:stCondLst>
+                      <p:childTnLst>
+                        <p:par>
+                          <p:cTn id="4" fill="hold">
+                            <p:stCondLst>
+                              <p:cond delay="0"/>
+                            </p:stCondLst>
+                            <p:childTnLst>
+                              <p:par>
+                                <p:cTn id="5" presetID="2" presetClass="entr" presetSubtype="4" fill="hold" nodeType="clickEffect">
+                                  <p:stCondLst>
+                                    <p:cond delay="0"/>
+                                  </p:stCondLst>
+                                  <p:childTnLst>
+                                    <p:set>
+                                      <p:cBhvr>
+                                        <p:cTn id="6" dur="1" fill="hold">
+                                          <p:stCondLst>
+                                            <p:cond delay="0"/>
+                                          </p:stCondLst>
+                                        </p:cTn>
+                                        <p:tgtEl>
+                                          <p:spTgt spid="9">
+                                            <p:txEl>
+                                              <p:pRg st="1" end="1"/>
+                                            </p:txEl>
+                                          </p:spTgt>
+                                        </p:tgtEl>
+                                        <p:attrNameLst>
+                                          <p:attrName>style.visibility</p:attrName>
+                                        </p:attrNameLst>
+                                      </p:cBhvr>
+                                      <p:to>
+                                        <p:strVal val="visible"/>
+                                      </p:to>
+                                    </p:set>
+                                    <p:anim calcmode="lin" valueType="num">
+                                      <p:cBhvr additive="base">
+                                        <p:cTn id="7" dur="500" fill="hold"/>
+                                        <p:tgtEl>
+                                          <p:spTgt spid="9">
+                                            <p:txEl>
+                                              <p:pRg st="1" end="1"/>
+                                            </p:txEl>
+                                          </p:spTgt>
+                                        </p:tgtEl>
+                                        <p:attrNameLst>
+                                          <p:attrName>ppt_x</p:attrName>
+                                        </p:attrNameLst>
+                                      </p:cBhvr>
+                                      <p:tavLst>
+                                        <p:tav tm="0">
+                                          <p:val>
+                                            <p:strVal val="#ppt_x"/>
+                                          </p:val>
+                                        </p:tav>
+                                        <p:tav tm="100000">
+                                          <p:val>
+                                            <p:strVal val="#ppt_x"/>
+                                          </p:val>
+                                        </p:tav>
+                                      </p:tavLst>
+                                    </p:anim>
+                                    <p:anim calcmode="lin" valueType="num">
+                                      <p:cBhvr additive="base">
+                                        <p:cTn id="8" dur="500" fill="hold"/>
+                                        <p:tgtEl>
+                                          <p:spTgt spid="9">
+                                            <p:txEl>
+                                              <p:pRg st="1" end="1"/>
+                                            </p:txEl>
+                                          </p:spTgt>
+                                        </p:tgtEl>
+                                        <p:attrNameLst>
+                                          <p:attrName>ppt_y</p:attrName>
+                                        </p:attrNameLst>
+                                      </p:cBhvr>
+                                      <p:tavLst>
+                                        <p:tav tm="0">
+                                          <p:val>
+                                            <p:strVal val="1+#ppt_h/2"/>
+                                          </p:val>
+                                        </p:tav>
+                                        <p:tav tm="100000">
+                                          <p:val>
+                                            <p:strVal val="#ppt_y"/>
+                                          </p:val>
+                                        </p:tav>
+                                      </p:tavLst>
+                                    </p:anim>
+                                  </p:childTnLst>
+                                </p:cTn>
+                              </p:par>
+                              <p:par>
+                                <p:cTn id="9" presetID="6" presetClass="entr" presetSubtype="32" fill="hold" nodeType="withEffect">
+                                  <p:stCondLst>
+                                    <p:cond delay="0"/>
+                                  </p:stCondLst>
+                                  <p:childTnLst>
+                                    <p:set>
+                                      <p:cBhvr>
+                                        <p:cTn id="10" dur="1" fill="hold">
+                                          <p:stCondLst>
+                                            <p:cond delay="0"/>
+                                          </p:stCondLst>
+                                        </p:cTn>
+                                        <p:tgtEl>
+                                          <p:spTgt spid="3"/>
+                                        </p:tgtEl>
+                                        <p:attrNameLst>
+                                          <p:attrName>style.visibility</p:attrName>
+                                        </p:attrNameLst>
+                                      </p:cBhvr>
+                                      <p:to>
+                                        <p:strVal val="visible"/>
+                                      </p:to>
+                                    </p:set>
+                                    <p:animEffect transition="in" filter="circle(out)">
+                                      <p:cBhvr>
+                                        <p:cTn id="11" dur="500"/>
+                                        <p:tgtEl>
+                                          <p:spTgt spid="3"/>
+                                        </p:tgtEl>
+                                      </p:cBhvr>
+                                    </p:animEffect>
+                                  </p:childTnLst>
+                                </p:cTn>
+                              </p:par>
+                            </p:childTnLst>
+                          </p:cTn>
+                        </p:par>
+                      </p:childTnLst>
+                    </p:cTn>
+                  </p:par>
+                  <p:par>
+                    <p:cTn id="12" fill="hold">
+                      <p:stCondLst>
+                        <p:cond delay="indefinite"/>
+                      </p:stCondLst>
+                      <p:childTnLst>
+                        <p:par>
+                          <p:cTn id="13" fill="hold">
+                            <p:stCondLst>
+                              <p:cond delay="0"/>
+                            </p:stCondLst>
+                            <p:childTnLst>
+                              <p:par>
+                                <p:cTn id="14" presetID="2" presetClass="entr" presetSubtype="4" fill="hold" nodeType="clickEffect">
+                                  <p:stCondLst>
+                                    <p:cond delay="0"/>
+                                  </p:stCondLst>
+                                  <p:childTnLst>
+                                    <p:set>
+                                      <p:cBhvr>
+                                        <p:cTn id="15" dur="1" fill="hold">
+                                          <p:stCondLst>
+                                            <p:cond delay="0"/>
+                                          </p:stCondLst>
+                                        </p:cTn>
+                                        <p:tgtEl>
+                                          <p:spTgt spid="9">
+                                            <p:txEl>
+                                              <p:pRg st="2" end="2"/>
+                                            </p:txEl>
+                                          </p:spTgt>
+                                        </p:tgtEl>
+                                        <p:attrNameLst>
+                                          <p:attrName>style.visibility</p:attrName>
+                                        </p:attrNameLst>
+                                      </p:cBhvr>
+                                      <p:to>
+                                        <p:strVal val="visible"/>
+                                      </p:to>
+                                    </p:set>
+                                    <p:anim calcmode="lin" valueType="num">
+                                      <p:cBhvr additive="base">
+                                        <p:cTn id="16" dur="500" fill="hold"/>
+                                        <p:tgtEl>
+                                          <p:spTgt spid="9">
+                                            <p:txEl>
+                                              <p:pRg st="2" end="2"/>
+                                            </p:txEl>
+                                          </p:spTgt>
+                                        </p:tgtEl>
+                                        <p:attrNameLst>
+                                          <p:attrName>ppt_x</p:attrName>
+                                        </p:attrNameLst>
+                                      </p:cBhvr>
+                                      <p:tavLst>
+                                        <p:tav tm="0">
+                                          <p:val>
+                                            <p:strVal val="#ppt_x"/>
+                                          </p:val>
+                                        </p:tav>
+                                        <p:tav tm="100000">
+                                          <p:val>
+                                            <p:strVal val="#ppt_x"/>
+                                          </p:val>
+                                        </p:tav>
+                                      </p:tavLst>
+                                    </p:anim>
+                                    <p:anim calcmode="lin" valueType="num">
+                                      <p:cBhvr additive="base">
+                                        <p:cTn id="17" dur="500" fill="hold"/>
+                                        <p:tgtEl>
+                                          <p:spTgt spid="9">
+                                            <p:txEl>
+                                              <p:pRg st="2" end="2"/>
+                                            </p:txEl>
+                                          </p:spTgt>
+                                        </p:tgtEl>
+                                        <p:attrNameLst>
+                                          <p:attrName>ppt_y</p:attrName>
+                                        </p:attrNameLst>
+                                      </p:cBhvr>
+                                      <p:tavLst>
+                                        <p:tav tm="0">
+                                          <p:val>
+                                            <p:strVal val="1+#ppt_h/2"/>
+                                          </p:val>
+                                        </p:tav>
+                                        <p:tav tm="100000">
+                                          <p:val>
+                                            <p:strVal val="#ppt_y"/>
+                                          </p:val>
+                                        </p:tav>
+                                      </p:tavLst>
+                                    </p:anim>
+                                  </p:childTnLst>
+                                </p:cTn>
+                              </p:par>
+                              <p:par>
+                                <p:cTn id="18" presetID="10" presetClass="exit" presetSubtype="0" fill="hold" nodeType="withEffect">
+                                  <p:stCondLst>
+                                    <p:cond delay="0"/>
+                                  </p:stCondLst>
+                                  <p:childTnLst>
+                                    <p:animEffect transition="out" filter="fade">
+                                      <p:cBhvr>
+                                        <p:cTn id="19" dur="500"/>
+                                        <p:tgtEl>
+                                          <p:spTgt spid="3"/>
+                                        </p:tgtEl>
+                                      </p:cBhvr>
+                                    </p:animEffect>
+                                    <p:set>
+                                      <p:cBhvr>
+                                        <p:cTn id="20" dur="1" fill="hold">
+                                          <p:stCondLst>
+                                            <p:cond delay="499"/>
+                                          </p:stCondLst>
+                                        </p:cTn>
+                                        <p:tgtEl>
+                                          <p:spTgt spid="3"/>
+                                        </p:tgtEl>
+                                        <p:attrNameLst>
+                                          <p:attrName>style.visibility</p:attrName>
+                                        </p:attrNameLst>
+                                      </p:cBhvr>
+                                      <p:to>
+                                        <p:strVal val="hidden"/>
+                                      </p:to>
+                                    </p:set>
+                                  </p:childTnLst>
+                                </p:cTn>
+                              </p:par>
+                              <p:par>
+                                <p:cTn id="21" presetID="6" presetClass="entr" presetSubtype="32" fill="hold" nodeType="withEffect">
+                                  <p:stCondLst>
+                                    <p:cond delay="0"/>
+                                  </p:stCondLst>
+                                  <p:childTnLst>
+                                    <p:set>
+                                      <p:cBhvr>
+                                        <p:cTn id="22" dur="1" fill="hold">
+                                          <p:stCondLst>
+                                            <p:cond delay="0"/>
+                                          </p:stCondLst>
+                                        </p:cTn>
+                                        <p:tgtEl>
+                                          <p:spTgt spid="7"/>
+                                        </p:tgtEl>
+                                        <p:attrNameLst>
+                                          <p:attrName>style.visibility</p:attrName>
+                                        </p:attrNameLst>
+                                      </p:cBhvr>
+                                      <p:to>
+                                        <p:strVal val="visible"/>
+                                      </p:to>
+                                    </p:set>
+                                    <p:animEffect transition="in" filter="circle(out)">
+                                      <p:cBhvr>
+                                        <p:cTn id="23" dur="500"/>
+                                        <p:tgtEl>
+                                          <p:spTgt spid="7"/>
+                                        </p:tgtEl>
+                                      </p:cBhvr>
+                                    </p:animEffect>
+                                  </p:childTnLst>
+                                </p:cTn>
+                              </p:par>
+                            </p:childTnLst>
+                          </p:cTn>
+                        </p:par>
+                      </p:childTnLst>
+                    </p:cTn>
+                  </p:par>
+                  <p:par>
+                    <p:cTn id="24" fill="hold">
+                      <p:stCondLst>
+                        <p:cond delay="indefinite"/>
+                      </p:stCondLst>
+                      <p:childTnLst>
+                        <p:par>
+                          <p:cTn id="25" fill="hold">
+                            <p:stCondLst>
+                              <p:cond delay="0"/>
+                            </p:stCondLst>
+                            <p:childTnLst>
+                              <p:par>
+                                <p:cTn id="26" presetID="2" presetClass="entr" presetSubtype="4" fill="hold" nodeType="clickEffect">
+                                  <p:stCondLst>
+                                    <p:cond delay="0"/>
+                                  </p:stCondLst>
+                                  <p:childTnLst>
+                                    <p:set>
+                                      <p:cBhvr>
+                                        <p:cTn id="27" dur="1" fill="hold">
+                                          <p:stCondLst>
+                                            <p:cond delay="0"/>
+                                          </p:stCondLst>
+                                        </p:cTn>
+                                        <p:tgtEl>
+                                          <p:spTgt spid="9">
+                                            <p:txEl>
+                                              <p:pRg st="3" end="3"/>
+                                            </p:txEl>
+                                          </p:spTgt>
+                                        </p:tgtEl>
+                                        <p:attrNameLst>
+                                          <p:attrName>style.visibility</p:attrName>
+                                        </p:attrNameLst>
+                                      </p:cBhvr>
+                                      <p:to>
+                                        <p:strVal val="visible"/>
+                                      </p:to>
+                                    </p:set>
+                                    <p:anim calcmode="lin" valueType="num">
+                                      <p:cBhvr additive="base">
+                                        <p:cTn id="28" dur="500" fill="hold"/>
+                                        <p:tgtEl>
+                                          <p:spTgt spid="9">
+                                            <p:txEl>
+                                              <p:pRg st="3" end="3"/>
+                                            </p:txEl>
+                                          </p:spTgt>
+                                        </p:tgtEl>
+                                        <p:attrNameLst>
+                                          <p:attrName>ppt_x</p:attrName>
+                                        </p:attrNameLst>
+                                      </p:cBhvr>
+                                      <p:tavLst>
+                                        <p:tav tm="0">
+                                          <p:val>
+                                            <p:strVal val="#ppt_x"/>
+                                          </p:val>
+                                        </p:tav>
+                                        <p:tav tm="100000">
+                                          <p:val>
+                                            <p:strVal val="#ppt_x"/>
+                                          </p:val>
+                                        </p:tav>
+                                      </p:tavLst>
+                                    </p:anim>
+                                    <p:anim calcmode="lin" valueType="num">
+                                      <p:cBhvr additive="base">
+                                        <p:cTn id="29" dur="500" fill="hold"/>
+                                        <p:tgtEl>
+                                          <p:spTgt spid="9">
+                                            <p:txEl>
+                                              <p:pRg st="3" end="3"/>
+                                            </p:txEl>
+                                          </p:spTgt>
+                                        </p:tgtEl>
+                                        <p:attrNameLst>
+                                          <p:attrName>ppt_y</p:attrName>
+                                        </p:attrNameLst>
+                                      </p:cBhvr>
+                                      <p:tavLst>
+                                        <p:tav tm="0">
+                                          <p:val>
+                                            <p:strVal val="1+#ppt_h/2"/>
+                                          </p:val>
+                                        </p:tav>
+                                        <p:tav tm="100000">
+                                          <p:val>
+                                            <p:strVal val="#ppt_y"/>
+                                          </p:val>
+                                        </p:tav>
+                                      </p:tavLst>
+                                    </p:anim>
+                                  </p:childTnLst>
+                                </p:cTn>
+                              </p:par>
+                              <p:par>
+                                <p:cTn id="30" presetID="10" presetClass="exit" presetSubtype="0" fill="hold" nodeType="withEffect">
+                                  <p:stCondLst>
+                                    <p:cond delay="0"/>
+                                  </p:stCondLst>
+                                  <p:childTnLst>
+                                    <p:animEffect transition="out" filter="fade">
+                                      <p:cBhvr>
+                                        <p:cTn id="31" dur="500"/>
+                                        <p:tgtEl>
+                                          <p:spTgt spid="7"/>
+                                        </p:tgtEl>
+                                      </p:cBhvr>
+                                    </p:animEffect>
+                                    <p:set>
+                                      <p:cBhvr>
+                                        <p:cTn id="32" dur="1" fill="hold">
+                                          <p:stCondLst>
+                                            <p:cond delay="499"/>
+                                          </p:stCondLst>
+                                        </p:cTn>
+                                        <p:tgtEl>
+                                          <p:spTgt spid="7"/>
+                                        </p:tgtEl>
+                                        <p:attrNameLst>
+                                          <p:attrName>style.visibility</p:attrName>
+                                        </p:attrNameLst>
+                                      </p:cBhvr>
+                                      <p:to>
+                                        <p:strVal val="hidden"/>
+                                      </p:to>
+                                    </p:set>
+                                  </p:childTnLst>
+                                </p:cTn>
+                              </p:par>
+                              <p:par>
+                                <p:cTn id="33" presetID="6" presetClass="entr" presetSubtype="32" fill="hold" nodeType="withEffect">
+                                  <p:stCondLst>
+                                    <p:cond delay="0"/>
+                                  </p:stCondLst>
+                                  <p:childTnLst>
+                                    <p:set>
+                                      <p:cBhvr>
+                                        <p:cTn id="34" dur="1" fill="hold">
+                                          <p:stCondLst>
+                                            <p:cond delay="0"/>
+                                          </p:stCondLst>
+                                        </p:cTn>
+                                        <p:tgtEl>
+                                          <p:spTgt spid="1032"/>
+                                        </p:tgtEl>
+                                        <p:attrNameLst>
+                                          <p:attrName>style.visibility</p:attrName>
+                                        </p:attrNameLst>
+                                      </p:cBhvr>
+                                      <p:to>
+                                        <p:strVal val="visible"/>
+                                      </p:to>
+                                    </p:set>
+                                    <p:animEffect transition="in" filter="circle(out)">
+                                      <p:cBhvr>
+                                        <p:cTn id="35" dur="500"/>
+                                        <p:tgtEl>
+                                          <p:spTgt spid="1032"/>
+                                        </p:tgtEl>
+                                      </p:cBhvr>
+                                    </p:animEffect>
+                                  </p:childTnLst>
+                                </p:cTn>
+                              </p:par>
+                            </p:childTnLst>
+                          </p:cTn>
+                        </p:par>
+                      </p:childTnLst>
+                    </p:cTn>
+                  </p:par>
+                </p:childTnLst>
+              </p:cTn>
+              <p:prevCondLst>
+                <p:cond evt="onPrev" delay="0">
+                  <p:tgtEl>
+                    <p:sldTgt/>
+                  </p:tgtEl>
+                </p:cond>
+              </p:prevCondLst>
+              <p:nextCondLst>
+                <p:cond evt="onNext" delay="0">
+                  <p:tgtEl>
+                    <p:sldTgt/>
+                  </p:tgtEl>
+                </p:cond>
+              </p:nextCondLst>
+            </p:seq>
+          </p:childTnLst>
+        </p:cTn>
+      </p:par>
+    </p:tnLst>
+  </p:timing>
 </p:sld>
 </file>
 
@@ -20407,6 +21013,219 @@
   <p:cSld>
     <p:spTree>
       <p:nvGrpSpPr>
+        <p:cNvPr id="1" name="">
+          <a:extLst>
+            <a:ext uri="{FF2B5EF4-FFF2-40B4-BE49-F238E27FC236}">
+              <a16:creationId xmlns:a16="http://schemas.microsoft.com/office/drawing/2014/main" id="{FC37D0A5-2052-D67C-358D-EF6B12467E50}"/>
+            </a:ext>
+          </a:extLst>
+        </p:cNvPr>
+        <p:cNvGrpSpPr/>
+        <p:nvPr/>
+      </p:nvGrpSpPr>
+      <p:grpSpPr>
+        <a:xfrm>
+          <a:off x="0" y="0"/>
+          <a:ext cx="0" cy="0"/>
+          <a:chOff x="0" y="0"/>
+          <a:chExt cx="0" cy="0"/>
+        </a:xfrm>
+      </p:grpSpPr>
+      <p:sp>
+        <p:nvSpPr>
+          <p:cNvPr id="2" name="Titolo 1">
+            <a:extLst>
+              <a:ext uri="{FF2B5EF4-FFF2-40B4-BE49-F238E27FC236}">
+                <a16:creationId xmlns:a16="http://schemas.microsoft.com/office/drawing/2014/main" id="{CDD0FFFD-7CBF-17A4-5EF1-ACD5F1BA0EE0}"/>
+              </a:ext>
+            </a:extLst>
+          </p:cNvPr>
+          <p:cNvSpPr>
+            <a:spLocks noGrp="1"/>
+          </p:cNvSpPr>
+          <p:nvPr>
+            <p:ph type="title"/>
+          </p:nvPr>
+        </p:nvSpPr>
+        <p:spPr/>
+        <p:txBody>
+          <a:bodyPr/>
+          <a:lstStyle/>
+          <a:p>
+            <a:r>
+              <a:rPr lang="en-US" dirty="0"/>
+              <a:t>Outline </a:t>
+            </a:r>
+          </a:p>
+        </p:txBody>
+      </p:sp>
+      <p:sp>
+        <p:nvSpPr>
+          <p:cNvPr id="3" name="Segnaposto contenuto 2">
+            <a:extLst>
+              <a:ext uri="{FF2B5EF4-FFF2-40B4-BE49-F238E27FC236}">
+                <a16:creationId xmlns:a16="http://schemas.microsoft.com/office/drawing/2014/main" id="{968ADCB4-F164-93EC-E97A-39A2276E4834}"/>
+              </a:ext>
+            </a:extLst>
+          </p:cNvPr>
+          <p:cNvSpPr>
+            <a:spLocks noGrp="1"/>
+          </p:cNvSpPr>
+          <p:nvPr>
+            <p:ph idx="1"/>
+          </p:nvPr>
+        </p:nvSpPr>
+        <p:spPr>
+          <a:xfrm>
+            <a:off x="664464" y="2041497"/>
+            <a:ext cx="10098024" cy="2613436"/>
+          </a:xfrm>
+        </p:spPr>
+        <p:txBody>
+          <a:bodyPr>
+            <a:noAutofit/>
+          </a:bodyPr>
+          <a:lstStyle/>
+          <a:p>
+            <a:r>
+              <a:rPr lang="en-US" sz="2000" dirty="0">
+                <a:solidFill>
+                  <a:schemeClr val="bg1">
+                    <a:lumMod val="65000"/>
+                  </a:schemeClr>
+                </a:solidFill>
+              </a:rPr>
+              <a:t>Why building a heuristic classifier</a:t>
+            </a:r>
+          </a:p>
+          <a:p>
+            <a:r>
+              <a:rPr lang="en-US" sz="2000" dirty="0">
+                <a:solidFill>
+                  <a:schemeClr val="bg1">
+                    <a:lumMod val="65000"/>
+                  </a:schemeClr>
+                </a:solidFill>
+              </a:rPr>
+              <a:t>Knowledge on roving signals: recap</a:t>
+            </a:r>
+          </a:p>
+          <a:p>
+            <a:r>
+              <a:rPr lang="en-US" sz="2000" dirty="0">
+                <a:solidFill>
+                  <a:schemeClr val="bg1">
+                    <a:lumMod val="65000"/>
+                  </a:schemeClr>
+                </a:solidFill>
+              </a:rPr>
+              <a:t>Data preparation</a:t>
+            </a:r>
+          </a:p>
+          <a:p>
+            <a:r>
+              <a:rPr lang="en-US" sz="2000" dirty="0">
+                <a:solidFill>
+                  <a:schemeClr val="bg1">
+                    <a:lumMod val="65000"/>
+                  </a:schemeClr>
+                </a:solidFill>
+              </a:rPr>
+              <a:t>Heuristic classifier: pseudo code</a:t>
+            </a:r>
+          </a:p>
+          <a:p>
+            <a:r>
+              <a:rPr lang="en-US" sz="2000" dirty="0">
+                <a:solidFill>
+                  <a:schemeClr val="bg1">
+                    <a:lumMod val="65000"/>
+                  </a:schemeClr>
+                </a:solidFill>
+              </a:rPr>
+              <a:t>Performance</a:t>
+            </a:r>
+          </a:p>
+          <a:p>
+            <a:r>
+              <a:rPr lang="en-US" sz="2000" dirty="0">
+                <a:solidFill>
+                  <a:schemeClr val="bg1">
+                    <a:lumMod val="65000"/>
+                  </a:schemeClr>
+                </a:solidFill>
+              </a:rPr>
+              <a:t>Conclusions </a:t>
+            </a:r>
+          </a:p>
+          <a:p>
+            <a:r>
+              <a:rPr lang="en-US" sz="2000" dirty="0"/>
+              <a:t>Appendices</a:t>
+            </a:r>
+            <a:endParaRPr lang="en-US" sz="1600" dirty="0"/>
+          </a:p>
+          <a:p>
+            <a:pPr marL="0" indent="0">
+              <a:buNone/>
+            </a:pPr>
+            <a:endParaRPr lang="en-US" sz="1600" dirty="0">
+              <a:solidFill>
+                <a:schemeClr val="bg1">
+                  <a:lumMod val="65000"/>
+                </a:schemeClr>
+              </a:solidFill>
+            </a:endParaRPr>
+          </a:p>
+        </p:txBody>
+      </p:sp>
+      <p:sp>
+        <p:nvSpPr>
+          <p:cNvPr id="4" name="Segnaposto numero diapositiva 3">
+            <a:extLst>
+              <a:ext uri="{FF2B5EF4-FFF2-40B4-BE49-F238E27FC236}">
+                <a16:creationId xmlns:a16="http://schemas.microsoft.com/office/drawing/2014/main" id="{795A8999-4998-8938-5248-544525BED9C7}"/>
+              </a:ext>
+            </a:extLst>
+          </p:cNvPr>
+          <p:cNvSpPr>
+            <a:spLocks noGrp="1"/>
+          </p:cNvSpPr>
+          <p:nvPr>
+            <p:ph type="sldNum" sz="quarter" idx="12"/>
+          </p:nvPr>
+        </p:nvSpPr>
+        <p:spPr/>
+        <p:txBody>
+          <a:bodyPr/>
+          <a:lstStyle/>
+          <a:p>
+            <a:fld id="{2FA0223F-D95A-431D-9A71-EDA7FA0C2F5B}" type="slidenum">
+              <a:rPr lang="en-US" smtClean="0"/>
+              <a:t>30</a:t>
+            </a:fld>
+            <a:endParaRPr lang="en-US" dirty="0"/>
+          </a:p>
+        </p:txBody>
+      </p:sp>
+    </p:spTree>
+    <p:extLst>
+      <p:ext uri="{BB962C8B-B14F-4D97-AF65-F5344CB8AC3E}">
+        <p14:creationId xmlns:p14="http://schemas.microsoft.com/office/powerpoint/2010/main" val="2986268060"/>
+      </p:ext>
+    </p:extLst>
+  </p:cSld>
+  <p:clrMapOvr>
+    <a:masterClrMapping/>
+  </p:clrMapOvr>
+</p:sld>
+</file>
+
+<file path=ppt/slides/slide31.xml><?xml version="1.0" encoding="utf-8"?>
+<p:sld xmlns:a="http://schemas.openxmlformats.org/drawingml/2006/main" xmlns:r="http://schemas.openxmlformats.org/officeDocument/2006/relationships" xmlns:p="http://schemas.openxmlformats.org/presentationml/2006/main">
+  <p:cSld>
+    <p:spTree>
+      <p:nvGrpSpPr>
         <p:cNvPr id="1" name=""/>
         <p:cNvGrpSpPr/>
         <p:nvPr/>
@@ -20526,7 +21345,7 @@
                 <a:tabLst/>
                 <a:defRPr/>
               </a:pPr>
-              <a:t>30</a:t>
+              <a:t>31</a:t>
             </a:fld>
             <a:endParaRPr kumimoji="0" lang="en-US" sz="1200" b="0" i="0" u="none" strike="noStrike" kern="1200" cap="none" spc="0" normalizeH="0" baseline="0" noProof="0">
               <a:ln>
@@ -21403,7 +22222,7 @@
                 <a:rPr lang="en-US" sz="1200" i="1" dirty="0">
                   <a:latin typeface="Calibri" panose="020F0502020204030204"/>
                 </a:rPr>
-                <a:t>His threshold normalized respect to the signal amplitude</a:t>
+                <a:t>Usage of Atrial/Ventricular ratio as feature</a:t>
               </a:r>
               <a:endParaRPr kumimoji="0" lang="en-US" sz="1200" i="0" u="none" strike="noStrike" kern="1200" cap="none" spc="0" normalizeH="0" baseline="0" noProof="0" dirty="0">
                 <a:ln>
@@ -22611,117 +23430,6 @@
                 </a:rPr>
                 <a:t>His threshold normalized respect to the signal amplitude</a:t>
               </a:r>
-              <a:endParaRPr kumimoji="0" lang="en-US" sz="1200" i="0" u="none" strike="noStrike" kern="1200" cap="none" spc="0" normalizeH="0" baseline="0" noProof="0" dirty="0">
-                <a:ln>
-                  <a:noFill/>
-                </a:ln>
-                <a:effectLst/>
-                <a:uLnTx/>
-                <a:uFillTx/>
-                <a:latin typeface="Calibri" panose="020F0502020204030204"/>
-                <a:ea typeface="+mn-ea"/>
-                <a:cs typeface="+mn-cs"/>
-              </a:endParaRPr>
-            </a:p>
-            <a:p>
-              <a:pPr marL="0" indent="0">
-                <a:buNone/>
-              </a:pPr>
-              <a:endParaRPr kumimoji="0" lang="en-US" sz="1400" b="0" i="0" u="none" strike="noStrike" kern="1200" cap="none" spc="0" normalizeH="0" baseline="0" noProof="0" dirty="0">
-                <a:ln>
-                  <a:noFill/>
-                </a:ln>
-                <a:solidFill>
-                  <a:prstClr val="black"/>
-                </a:solidFill>
-                <a:effectLst/>
-                <a:uLnTx/>
-                <a:uFillTx/>
-                <a:latin typeface="Calibri" panose="020F0502020204030204"/>
-                <a:ea typeface="+mn-ea"/>
-                <a:cs typeface="+mn-cs"/>
-              </a:endParaRPr>
-            </a:p>
-            <a:p>
-              <a:pPr marL="0" indent="0">
-                <a:buNone/>
-              </a:pPr>
-              <a:endParaRPr kumimoji="0" lang="en-US" sz="1400" b="0" i="0" u="none" strike="noStrike" kern="1200" cap="none" spc="0" normalizeH="0" baseline="0" noProof="0" dirty="0">
-                <a:ln>
-                  <a:noFill/>
-                </a:ln>
-                <a:solidFill>
-                  <a:prstClr val="black"/>
-                </a:solidFill>
-                <a:effectLst/>
-                <a:uLnTx/>
-                <a:uFillTx/>
-                <a:latin typeface="Calibri" panose="020F0502020204030204"/>
-                <a:ea typeface="+mn-ea"/>
-                <a:cs typeface="+mn-cs"/>
-              </a:endParaRPr>
-            </a:p>
-            <a:p>
-              <a:pPr marL="0" indent="0">
-                <a:buNone/>
-              </a:pPr>
-              <a:endParaRPr kumimoji="0" lang="en-US" sz="1400" b="0" i="0" u="none" strike="noStrike" kern="1200" cap="none" spc="0" normalizeH="0" baseline="0" noProof="0" dirty="0">
-                <a:ln>
-                  <a:noFill/>
-                </a:ln>
-                <a:solidFill>
-                  <a:prstClr val="black"/>
-                </a:solidFill>
-                <a:effectLst/>
-                <a:uLnTx/>
-                <a:uFillTx/>
-                <a:latin typeface="Calibri" panose="020F0502020204030204"/>
-                <a:ea typeface="+mn-ea"/>
-                <a:cs typeface="+mn-cs"/>
-              </a:endParaRPr>
-            </a:p>
-            <a:p>
-              <a:pPr marL="0" indent="0">
-                <a:buNone/>
-              </a:pPr>
-              <a:endParaRPr kumimoji="0" lang="en-US" sz="1400" b="0" i="0" u="none" strike="noStrike" kern="1200" cap="none" spc="0" normalizeH="0" baseline="0" noProof="0" dirty="0">
-                <a:ln>
-                  <a:noFill/>
-                </a:ln>
-                <a:solidFill>
-                  <a:prstClr val="black"/>
-                </a:solidFill>
-                <a:effectLst/>
-                <a:uLnTx/>
-                <a:uFillTx/>
-                <a:latin typeface="Calibri" panose="020F0502020204030204"/>
-                <a:ea typeface="+mn-ea"/>
-                <a:cs typeface="+mn-cs"/>
-              </a:endParaRPr>
-            </a:p>
-            <a:p>
-              <a:pPr marL="0" indent="0">
-                <a:buNone/>
-              </a:pPr>
-              <a:endParaRPr kumimoji="0" lang="en-US" sz="1400" b="0" i="0" u="none" strike="noStrike" kern="1200" cap="none" spc="0" normalizeH="0" baseline="0" noProof="0" dirty="0">
-                <a:ln>
-                  <a:noFill/>
-                </a:ln>
-                <a:solidFill>
-                  <a:prstClr val="black"/>
-                </a:solidFill>
-                <a:effectLst/>
-                <a:uLnTx/>
-                <a:uFillTx/>
-                <a:latin typeface="Calibri" panose="020F0502020204030204"/>
-                <a:ea typeface="+mn-ea"/>
-                <a:cs typeface="+mn-cs"/>
-              </a:endParaRPr>
-            </a:p>
-            <a:p>
-              <a:pPr marL="0" indent="0">
-                <a:buNone/>
-              </a:pPr>
               <a:endParaRPr kumimoji="0" lang="en-US" sz="1400" b="0" i="0" u="none" strike="noStrike" kern="1200" cap="none" spc="0" normalizeH="0" baseline="0" noProof="0" dirty="0">
                 <a:ln>
                   <a:noFill/>
@@ -23931,7 +24639,7 @@
 </p:sld>
 </file>
 
-<file path=ppt/slides/slide31.xml><?xml version="1.0" encoding="utf-8"?>
+<file path=ppt/slides/slide32.xml><?xml version="1.0" encoding="utf-8"?>
 <p:sld xmlns:a="http://schemas.openxmlformats.org/drawingml/2006/main" xmlns:r="http://schemas.openxmlformats.org/officeDocument/2006/relationships" xmlns:p="http://schemas.openxmlformats.org/presentationml/2006/main">
   <p:cSld>
     <p:spTree>
@@ -24012,7 +24720,7 @@
           <a:p>
             <a:fld id="{2FA0223F-D95A-431D-9A71-EDA7FA0C2F5B}" type="slidenum">
               <a:rPr lang="en-US" smtClean="0"/>
-              <a:t>31</a:t>
+              <a:t>32</a:t>
             </a:fld>
             <a:endParaRPr lang="en-US"/>
           </a:p>
@@ -24169,7 +24877,7 @@
             </a:pPr>
             <a:r>
               <a:rPr lang="en-US" sz="1200" dirty="0"/>
-              <a:t>The CM and the metrics summary are reported on the right.</a:t>
+              <a:t>The CM and the metrics summary are reported on the right (only for atrial/vent ratio strategy).</a:t>
             </a:r>
           </a:p>
           <a:p>
@@ -25349,7 +26057,7 @@
 </p:sld>
 </file>
 
-<file path=ppt/slides/slide32.xml><?xml version="1.0" encoding="utf-8"?>
+<file path=ppt/slides/slide33.xml><?xml version="1.0" encoding="utf-8"?>
 <p:sld xmlns:a="http://schemas.openxmlformats.org/drawingml/2006/main" xmlns:r="http://schemas.openxmlformats.org/officeDocument/2006/relationships" xmlns:p="http://schemas.openxmlformats.org/presentationml/2006/main">
   <p:cSld>
     <p:spTree>
@@ -25430,7 +26138,7 @@
           <a:p>
             <a:fld id="{2FA0223F-D95A-431D-9A71-EDA7FA0C2F5B}" type="slidenum">
               <a:rPr lang="en-US" smtClean="0"/>
-              <a:t>32</a:t>
+              <a:t>33</a:t>
             </a:fld>
             <a:endParaRPr lang="en-US"/>
           </a:p>
@@ -26049,7 +26757,7 @@
 </p:sld>
 </file>
 
-<file path=ppt/slides/slide33.xml><?xml version="1.0" encoding="utf-8"?>
+<file path=ppt/slides/slide34.xml><?xml version="1.0" encoding="utf-8"?>
 <p:sld xmlns:a="http://schemas.openxmlformats.org/drawingml/2006/main" xmlns:r="http://schemas.openxmlformats.org/officeDocument/2006/relationships" xmlns:p="http://schemas.openxmlformats.org/presentationml/2006/main">
   <p:cSld>
     <p:spTree>
@@ -26130,7 +26838,7 @@
           <a:p>
             <a:fld id="{2FA0223F-D95A-431D-9A71-EDA7FA0C2F5B}" type="slidenum">
               <a:rPr lang="en-US" smtClean="0"/>
-              <a:t>33</a:t>
+              <a:t>34</a:t>
             </a:fld>
             <a:endParaRPr lang="en-US"/>
           </a:p>
@@ -26749,7 +27457,7 @@
 </p:sld>
 </file>
 
-<file path=ppt/slides/slide34.xml><?xml version="1.0" encoding="utf-8"?>
+<file path=ppt/slides/slide35.xml><?xml version="1.0" encoding="utf-8"?>
 <p:sld xmlns:a="http://schemas.openxmlformats.org/drawingml/2006/main" xmlns:r="http://schemas.openxmlformats.org/officeDocument/2006/relationships" xmlns:p="http://schemas.openxmlformats.org/presentationml/2006/main" show="0">
   <p:cSld>
     <p:spTree>
@@ -26830,7 +27538,7 @@
           <a:p>
             <a:fld id="{2FA0223F-D95A-431D-9A71-EDA7FA0C2F5B}" type="slidenum">
               <a:rPr lang="en-US" smtClean="0"/>
-              <a:t>34</a:t>
+              <a:t>35</a:t>
             </a:fld>
             <a:endParaRPr lang="en-US"/>
           </a:p>
@@ -28231,7 +28939,7 @@
 </p:sld>
 </file>
 
-<file path=ppt/slides/slide35.xml><?xml version="1.0" encoding="utf-8"?>
+<file path=ppt/slides/slide36.xml><?xml version="1.0" encoding="utf-8"?>
 <p:sld xmlns:a="http://schemas.openxmlformats.org/drawingml/2006/main" xmlns:r="http://schemas.openxmlformats.org/officeDocument/2006/relationships" xmlns:p="http://schemas.openxmlformats.org/presentationml/2006/main" show="0">
   <p:cSld>
     <p:spTree>
@@ -28317,7 +29025,7 @@
           <a:p>
             <a:fld id="{2FA0223F-D95A-431D-9A71-EDA7FA0C2F5B}" type="slidenum">
               <a:rPr lang="en-US" smtClean="0"/>
-              <a:t>35</a:t>
+              <a:t>36</a:t>
             </a:fld>
             <a:endParaRPr lang="en-US"/>
           </a:p>

</xml_diff>